<commit_message>
Updates to slides as per latest version
</commit_message>
<xml_diff>
--- a/Content/Ansys_Python_Manager_PyCon_India_2024.pptx
+++ b/Content/Ansys_Python_Manager_PyCon_India_2024.pptx
@@ -5,10 +5,10 @@
     <p:sldMasterId id="2147483648" r:id="rId4"/>
   </p:sldMasterIdLst>
   <p:notesMasterIdLst>
-    <p:notesMasterId r:id="rId13"/>
+    <p:notesMasterId r:id="rId11"/>
   </p:notesMasterIdLst>
   <p:handoutMasterIdLst>
-    <p:handoutMasterId r:id="rId14"/>
+    <p:handoutMasterId r:id="rId12"/>
   </p:handoutMasterIdLst>
   <p:sldIdLst>
     <p:sldId id="256" r:id="rId5"/>
@@ -17,8 +17,6 @@
     <p:sldId id="260" r:id="rId8"/>
     <p:sldId id="262" r:id="rId9"/>
     <p:sldId id="261" r:id="rId10"/>
-    <p:sldId id="263" r:id="rId11"/>
-    <p:sldId id="264" r:id="rId12"/>
   </p:sldIdLst>
   <p:sldSz cx="12192000" cy="6858000"/>
   <p:notesSz cx="6858000" cy="9144000"/>
@@ -130,13 +128,307 @@
 
 <file path=ppt/authors.xml><?xml version="1.0" encoding="utf-8"?>
 <p188:authorLst xmlns:a="http://schemas.openxmlformats.org/drawingml/2006/main" xmlns:r="http://schemas.openxmlformats.org/officeDocument/2006/relationships" xmlns:p188="http://schemas.microsoft.com/office/powerpoint/2018/8/main">
-  <p188:author id="{7476A929-2638-C5BF-5092-5011061A6A9F}" name="Abhishek Chitwar" initials="AC" userId="S::abhishek.chitwar@ansys.com::538a3118-df36-42bc-a284-8b221ded21c1" providerId="AD"/>
   <p188:author id="{EAFCA86E-94FC-CBD4-D3EB-5E07C629632D}" name="Matt Ladzinski" initials="ML" userId="S::matthew.ladzinski@ansys.com::a2fc39c3-59b8-4eef-8928-588fd4e7a2da" providerId="AD"/>
   <p188:author id="{0073BFB9-EE3A-E6C7-5565-E398309BE26F}" name="Stephanie Eftimiades" initials="SE" userId="S::stephanie.eftimiades@ansys.com::dd506e20-6f88-4ca1-ab9b-45c428a58ae5" providerId="AD"/>
-  <p188:author id="{DA4811BA-E7CE-6322-9A96-A8E8EBDEF236}" name="Sandeep Medikonda" initials="SM" userId="S::sandeep.medikonda@ansys.com::1b710429-5ba7-4c43-aeca-23da86e5ed78" providerId="AD"/>
   <p188:author id="{69B8CEE6-5325-459B-0E13-BE802EEB4BD4}" name="Jeff Gorham" initials="JG" userId="S::jeff.gorham@ansys.com::12a581d4-bba8-4f31-a3bf-24df60987fbd" providerId="AD"/>
   <p188:author id="{FFCE0FFF-07F7-DC3E-554A-65A9F3BF688C}" name="Reni Raju" initials="RR" userId="S::reni.raju@ansys.com::6d53f095-cd32-4325-9104-b47221526866" providerId="AD"/>
 </p188:authorLst>
+</file>
+
+<file path=ppt/revisionInfo.xml><?xml version="1.0" encoding="utf-8"?>
+<p1510:revInfo xmlns:a="http://schemas.openxmlformats.org/drawingml/2006/main" xmlns:r="http://schemas.openxmlformats.org/officeDocument/2006/relationships" xmlns:p1510="http://schemas.microsoft.com/office/powerpoint/2015/10/main">
+  <p1510:revLst>
+    <p1510:client id="{924A109B-860D-460D-BC2C-E710C2E88A23}" v="1" dt="2024-05-15T11:12:03.837"/>
+  </p1510:revLst>
+</p1510:revInfo>
+</file>
+
+<file path=ppt/changesInfos/changesInfo1.xml><?xml version="1.0" encoding="utf-8"?>
+<pc:chgInfo xmlns:a="http://schemas.openxmlformats.org/drawingml/2006/main" xmlns:r="http://schemas.openxmlformats.org/officeDocument/2006/relationships" xmlns:ac="http://schemas.microsoft.com/office/drawing/2013/main/command" xmlns:pc="http://schemas.microsoft.com/office/powerpoint/2013/main/command">
+  <pc:docChgLst>
+    <pc:chgData name="Abhishek Chitwar" userId="538a3118-df36-42bc-a284-8b221ded21c1" providerId="ADAL" clId="{924A109B-860D-460D-BC2C-E710C2E88A23}"/>
+    <pc:docChg chg="custSel modSld">
+      <pc:chgData name="Abhishek Chitwar" userId="538a3118-df36-42bc-a284-8b221ded21c1" providerId="ADAL" clId="{924A109B-860D-460D-BC2C-E710C2E88A23}" dt="2024-05-15T11:16:20.355" v="38" actId="1035"/>
+      <pc:docMkLst>
+        <pc:docMk/>
+      </pc:docMkLst>
+      <pc:sldChg chg="addSp delSp modSp mod">
+        <pc:chgData name="Abhishek Chitwar" userId="538a3118-df36-42bc-a284-8b221ded21c1" providerId="ADAL" clId="{924A109B-860D-460D-BC2C-E710C2E88A23}" dt="2024-05-15T11:16:20.355" v="38" actId="1035"/>
+        <pc:sldMkLst>
+          <pc:docMk/>
+          <pc:sldMk cId="2617764405" sldId="262"/>
+        </pc:sldMkLst>
+        <pc:spChg chg="mod topLvl">
+          <ac:chgData name="Abhishek Chitwar" userId="538a3118-df36-42bc-a284-8b221ded21c1" providerId="ADAL" clId="{924A109B-860D-460D-BC2C-E710C2E88A23}" dt="2024-05-15T11:15:42.791" v="27" actId="1076"/>
+          <ac:spMkLst>
+            <pc:docMk/>
+            <pc:sldMk cId="2617764405" sldId="262"/>
+            <ac:spMk id="19" creationId="{C1309A37-ECE1-1E74-04E3-CA000E63C82E}"/>
+          </ac:spMkLst>
+        </pc:spChg>
+        <pc:spChg chg="mod topLvl">
+          <ac:chgData name="Abhishek Chitwar" userId="538a3118-df36-42bc-a284-8b221ded21c1" providerId="ADAL" clId="{924A109B-860D-460D-BC2C-E710C2E88A23}" dt="2024-05-15T11:15:33.031" v="26" actId="1076"/>
+          <ac:spMkLst>
+            <pc:docMk/>
+            <pc:sldMk cId="2617764405" sldId="262"/>
+            <ac:spMk id="20" creationId="{053B4538-4321-85F9-AA9E-3E3105BE2D5B}"/>
+          </ac:spMkLst>
+        </pc:spChg>
+        <pc:spChg chg="mod ord topLvl">
+          <ac:chgData name="Abhishek Chitwar" userId="538a3118-df36-42bc-a284-8b221ded21c1" providerId="ADAL" clId="{924A109B-860D-460D-BC2C-E710C2E88A23}" dt="2024-05-15T11:15:28.221" v="25" actId="1076"/>
+          <ac:spMkLst>
+            <pc:docMk/>
+            <pc:sldMk cId="2617764405" sldId="262"/>
+            <ac:spMk id="21" creationId="{90CA5E97-3CFA-1B5B-18EA-E341BA8A42BF}"/>
+          </ac:spMkLst>
+        </pc:spChg>
+        <pc:spChg chg="mod">
+          <ac:chgData name="Abhishek Chitwar" userId="538a3118-df36-42bc-a284-8b221ded21c1" providerId="ADAL" clId="{924A109B-860D-460D-BC2C-E710C2E88A23}" dt="2024-05-15T11:16:20.355" v="38" actId="1035"/>
+          <ac:spMkLst>
+            <pc:docMk/>
+            <pc:sldMk cId="2617764405" sldId="262"/>
+            <ac:spMk id="22" creationId="{B79F84DC-E44C-B6F1-BA0B-0D643FF0742D}"/>
+          </ac:spMkLst>
+        </pc:spChg>
+        <pc:spChg chg="mod">
+          <ac:chgData name="Abhishek Chitwar" userId="538a3118-df36-42bc-a284-8b221ded21c1" providerId="ADAL" clId="{924A109B-860D-460D-BC2C-E710C2E88A23}" dt="2024-05-15T11:16:20.355" v="38" actId="1035"/>
+          <ac:spMkLst>
+            <pc:docMk/>
+            <pc:sldMk cId="2617764405" sldId="262"/>
+            <ac:spMk id="23" creationId="{6DD9E3A1-56EC-B1B4-C0C3-DFFD2D1E27EA}"/>
+          </ac:spMkLst>
+        </pc:spChg>
+        <pc:spChg chg="mod">
+          <ac:chgData name="Abhishek Chitwar" userId="538a3118-df36-42bc-a284-8b221ded21c1" providerId="ADAL" clId="{924A109B-860D-460D-BC2C-E710C2E88A23}" dt="2024-05-15T11:16:20.355" v="38" actId="1035"/>
+          <ac:spMkLst>
+            <pc:docMk/>
+            <pc:sldMk cId="2617764405" sldId="262"/>
+            <ac:spMk id="24" creationId="{ED0ECA09-AB0B-40AE-8333-BB759AF3AB7A}"/>
+          </ac:spMkLst>
+        </pc:spChg>
+        <pc:spChg chg="mod">
+          <ac:chgData name="Abhishek Chitwar" userId="538a3118-df36-42bc-a284-8b221ded21c1" providerId="ADAL" clId="{924A109B-860D-460D-BC2C-E710C2E88A23}" dt="2024-05-15T11:16:20.355" v="38" actId="1035"/>
+          <ac:spMkLst>
+            <pc:docMk/>
+            <pc:sldMk cId="2617764405" sldId="262"/>
+            <ac:spMk id="25" creationId="{3BF79E7C-6D83-6E26-9272-C23AE45EC2C8}"/>
+          </ac:spMkLst>
+        </pc:spChg>
+        <pc:spChg chg="mod">
+          <ac:chgData name="Abhishek Chitwar" userId="538a3118-df36-42bc-a284-8b221ded21c1" providerId="ADAL" clId="{924A109B-860D-460D-BC2C-E710C2E88A23}" dt="2024-05-15T11:15:57.021" v="29" actId="14100"/>
+          <ac:spMkLst>
+            <pc:docMk/>
+            <pc:sldMk cId="2617764405" sldId="262"/>
+            <ac:spMk id="26" creationId="{E7BB3498-0C83-C240-38FF-7526E59DE37D}"/>
+          </ac:spMkLst>
+        </pc:spChg>
+        <pc:grpChg chg="del">
+          <ac:chgData name="Abhishek Chitwar" userId="538a3118-df36-42bc-a284-8b221ded21c1" providerId="ADAL" clId="{924A109B-860D-460D-BC2C-E710C2E88A23}" dt="2024-05-15T11:12:03.837" v="10" actId="165"/>
+          <ac:grpSpMkLst>
+            <pc:docMk/>
+            <pc:sldMk cId="2617764405" sldId="262"/>
+            <ac:grpSpMk id="14" creationId="{40D8047C-8BEE-E638-83E1-C604383804BF}"/>
+          </ac:grpSpMkLst>
+        </pc:grpChg>
+        <pc:picChg chg="add mod ord">
+          <ac:chgData name="Abhishek Chitwar" userId="538a3118-df36-42bc-a284-8b221ded21c1" providerId="ADAL" clId="{924A109B-860D-460D-BC2C-E710C2E88A23}" dt="2024-05-15T11:14:25.218" v="17" actId="166"/>
+          <ac:picMkLst>
+            <pc:docMk/>
+            <pc:sldMk cId="2617764405" sldId="262"/>
+            <ac:picMk id="4" creationId="{066EE2CC-D446-9BBF-F8E9-350CCCD3E21D}"/>
+          </ac:picMkLst>
+        </pc:picChg>
+        <pc:picChg chg="mod topLvl">
+          <ac:chgData name="Abhishek Chitwar" userId="538a3118-df36-42bc-a284-8b221ded21c1" providerId="ADAL" clId="{924A109B-860D-460D-BC2C-E710C2E88A23}" dt="2024-05-15T11:12:03.837" v="10" actId="165"/>
+          <ac:picMkLst>
+            <pc:docMk/>
+            <pc:sldMk cId="2617764405" sldId="262"/>
+            <ac:picMk id="15" creationId="{CDCD5ADC-3C33-6B1E-EB18-6FC2BC43483F}"/>
+          </ac:picMkLst>
+        </pc:picChg>
+        <pc:picChg chg="mod topLvl">
+          <ac:chgData name="Abhishek Chitwar" userId="538a3118-df36-42bc-a284-8b221ded21c1" providerId="ADAL" clId="{924A109B-860D-460D-BC2C-E710C2E88A23}" dt="2024-05-15T11:12:03.837" v="10" actId="165"/>
+          <ac:picMkLst>
+            <pc:docMk/>
+            <pc:sldMk cId="2617764405" sldId="262"/>
+            <ac:picMk id="16" creationId="{D427F113-1841-AAB2-34F1-B12D5196D14F}"/>
+          </ac:picMkLst>
+        </pc:picChg>
+        <pc:picChg chg="del mod topLvl">
+          <ac:chgData name="Abhishek Chitwar" userId="538a3118-df36-42bc-a284-8b221ded21c1" providerId="ADAL" clId="{924A109B-860D-460D-BC2C-E710C2E88A23}" dt="2024-05-15T11:13:37.362" v="11" actId="478"/>
+          <ac:picMkLst>
+            <pc:docMk/>
+            <pc:sldMk cId="2617764405" sldId="262"/>
+            <ac:picMk id="17" creationId="{E03A7B7C-DC1D-0D7F-B9A9-204F73D90B60}"/>
+          </ac:picMkLst>
+        </pc:picChg>
+      </pc:sldChg>
+    </pc:docChg>
+  </pc:docChgLst>
+  <pc:docChgLst>
+    <pc:chgData name="Abhishek Chitwar" userId="538a3118-df36-42bc-a284-8b221ded21c1" providerId="ADAL" clId="{0ADA3548-78A1-4B73-806C-37D99AB3624A}"/>
+    <pc:docChg chg="undo custSel delSld modSld">
+      <pc:chgData name="Abhishek Chitwar" userId="538a3118-df36-42bc-a284-8b221ded21c1" providerId="ADAL" clId="{0ADA3548-78A1-4B73-806C-37D99AB3624A}" dt="2024-03-27T06:23:39.226" v="199" actId="5793"/>
+      <pc:docMkLst>
+        <pc:docMk/>
+      </pc:docMkLst>
+      <pc:sldChg chg="modSp mod">
+        <pc:chgData name="Abhishek Chitwar" userId="538a3118-df36-42bc-a284-8b221ded21c1" providerId="ADAL" clId="{0ADA3548-78A1-4B73-806C-37D99AB3624A}" dt="2024-03-27T06:23:39.226" v="199" actId="5793"/>
+        <pc:sldMkLst>
+          <pc:docMk/>
+          <pc:sldMk cId="3071185635" sldId="257"/>
+        </pc:sldMkLst>
+        <pc:spChg chg="mod">
+          <ac:chgData name="Abhishek Chitwar" userId="538a3118-df36-42bc-a284-8b221ded21c1" providerId="ADAL" clId="{0ADA3548-78A1-4B73-806C-37D99AB3624A}" dt="2024-03-27T06:23:39.226" v="199" actId="5793"/>
+          <ac:spMkLst>
+            <pc:docMk/>
+            <pc:sldMk cId="3071185635" sldId="257"/>
+            <ac:spMk id="3" creationId="{E34C684F-4833-4BF4-3EE4-1489E3D3969A}"/>
+          </ac:spMkLst>
+        </pc:spChg>
+      </pc:sldChg>
+      <pc:sldChg chg="addSp modSp mod">
+        <pc:chgData name="Abhishek Chitwar" userId="538a3118-df36-42bc-a284-8b221ded21c1" providerId="ADAL" clId="{0ADA3548-78A1-4B73-806C-37D99AB3624A}" dt="2024-03-26T17:07:59.975" v="197" actId="113"/>
+        <pc:sldMkLst>
+          <pc:docMk/>
+          <pc:sldMk cId="333586048" sldId="258"/>
+        </pc:sldMkLst>
+        <pc:spChg chg="mod">
+          <ac:chgData name="Abhishek Chitwar" userId="538a3118-df36-42bc-a284-8b221ded21c1" providerId="ADAL" clId="{0ADA3548-78A1-4B73-806C-37D99AB3624A}" dt="2024-03-26T17:07:59.975" v="197" actId="113"/>
+          <ac:spMkLst>
+            <pc:docMk/>
+            <pc:sldMk cId="333586048" sldId="258"/>
+            <ac:spMk id="3" creationId="{BDF84946-47F9-DEE3-1FF4-096A39018A43}"/>
+          </ac:spMkLst>
+        </pc:spChg>
+        <pc:spChg chg="add mod">
+          <ac:chgData name="Abhishek Chitwar" userId="538a3118-df36-42bc-a284-8b221ded21c1" providerId="ADAL" clId="{0ADA3548-78A1-4B73-806C-37D99AB3624A}" dt="2024-03-26T17:07:44.430" v="196" actId="1035"/>
+          <ac:spMkLst>
+            <pc:docMk/>
+            <pc:sldMk cId="333586048" sldId="258"/>
+            <ac:spMk id="7" creationId="{40A30D88-89B8-5101-5F87-AD9620AEF115}"/>
+          </ac:spMkLst>
+        </pc:spChg>
+        <pc:picChg chg="mod">
+          <ac:chgData name="Abhishek Chitwar" userId="538a3118-df36-42bc-a284-8b221ded21c1" providerId="ADAL" clId="{0ADA3548-78A1-4B73-806C-37D99AB3624A}" dt="2024-03-26T17:07:44.430" v="196" actId="1035"/>
+          <ac:picMkLst>
+            <pc:docMk/>
+            <pc:sldMk cId="333586048" sldId="258"/>
+            <ac:picMk id="5" creationId="{42202154-C6AB-5420-A41D-E96CB4B2BA1E}"/>
+          </ac:picMkLst>
+        </pc:picChg>
+        <pc:picChg chg="add mod">
+          <ac:chgData name="Abhishek Chitwar" userId="538a3118-df36-42bc-a284-8b221ded21c1" providerId="ADAL" clId="{0ADA3548-78A1-4B73-806C-37D99AB3624A}" dt="2024-03-26T17:07:44.430" v="196" actId="1035"/>
+          <ac:picMkLst>
+            <pc:docMk/>
+            <pc:sldMk cId="333586048" sldId="258"/>
+            <ac:picMk id="9" creationId="{08AE5334-2E58-B2DA-B306-B4515EB10A5D}"/>
+          </ac:picMkLst>
+        </pc:picChg>
+      </pc:sldChg>
+      <pc:sldChg chg="del">
+        <pc:chgData name="Abhishek Chitwar" userId="538a3118-df36-42bc-a284-8b221ded21c1" providerId="ADAL" clId="{0ADA3548-78A1-4B73-806C-37D99AB3624A}" dt="2024-03-26T16:04:22.344" v="0" actId="47"/>
+        <pc:sldMkLst>
+          <pc:docMk/>
+          <pc:sldMk cId="4111915235" sldId="259"/>
+        </pc:sldMkLst>
+      </pc:sldChg>
+      <pc:sldChg chg="modSp mod">
+        <pc:chgData name="Abhishek Chitwar" userId="538a3118-df36-42bc-a284-8b221ded21c1" providerId="ADAL" clId="{0ADA3548-78A1-4B73-806C-37D99AB3624A}" dt="2024-03-26T16:59:19.384" v="81" actId="15"/>
+        <pc:sldMkLst>
+          <pc:docMk/>
+          <pc:sldMk cId="3587157755" sldId="260"/>
+        </pc:sldMkLst>
+        <pc:spChg chg="mod">
+          <ac:chgData name="Abhishek Chitwar" userId="538a3118-df36-42bc-a284-8b221ded21c1" providerId="ADAL" clId="{0ADA3548-78A1-4B73-806C-37D99AB3624A}" dt="2024-03-26T16:59:19.384" v="81" actId="15"/>
+          <ac:spMkLst>
+            <pc:docMk/>
+            <pc:sldMk cId="3587157755" sldId="260"/>
+            <ac:spMk id="6" creationId="{C3139D00-C843-D952-88F2-20B00E03557F}"/>
+          </ac:spMkLst>
+        </pc:spChg>
+      </pc:sldChg>
+      <pc:sldChg chg="addSp modSp mod">
+        <pc:chgData name="Abhishek Chitwar" userId="538a3118-df36-42bc-a284-8b221ded21c1" providerId="ADAL" clId="{0ADA3548-78A1-4B73-806C-37D99AB3624A}" dt="2024-03-26T17:00:30.329" v="91"/>
+        <pc:sldMkLst>
+          <pc:docMk/>
+          <pc:sldMk cId="3831838140" sldId="261"/>
+        </pc:sldMkLst>
+        <pc:spChg chg="mod">
+          <ac:chgData name="Abhishek Chitwar" userId="538a3118-df36-42bc-a284-8b221ded21c1" providerId="ADAL" clId="{0ADA3548-78A1-4B73-806C-37D99AB3624A}" dt="2024-03-26T17:00:30.329" v="91"/>
+          <ac:spMkLst>
+            <pc:docMk/>
+            <pc:sldMk cId="3831838140" sldId="261"/>
+            <ac:spMk id="2" creationId="{B308799C-6583-4894-F54E-35FDA88542D4}"/>
+          </ac:spMkLst>
+        </pc:spChg>
+        <pc:spChg chg="add mod">
+          <ac:chgData name="Abhishek Chitwar" userId="538a3118-df36-42bc-a284-8b221ded21c1" providerId="ADAL" clId="{0ADA3548-78A1-4B73-806C-37D99AB3624A}" dt="2024-03-26T16:05:09.666" v="25" actId="1076"/>
+          <ac:spMkLst>
+            <pc:docMk/>
+            <pc:sldMk cId="3831838140" sldId="261"/>
+            <ac:spMk id="6" creationId="{8ABC665D-854A-2754-CE9F-6F86924B5423}"/>
+          </ac:spMkLst>
+        </pc:spChg>
+      </pc:sldChg>
+      <pc:sldChg chg="addSp delSp modSp mod">
+        <pc:chgData name="Abhishek Chitwar" userId="538a3118-df36-42bc-a284-8b221ded21c1" providerId="ADAL" clId="{0ADA3548-78A1-4B73-806C-37D99AB3624A}" dt="2024-03-26T16:59:07.595" v="78" actId="20577"/>
+        <pc:sldMkLst>
+          <pc:docMk/>
+          <pc:sldMk cId="2617764405" sldId="262"/>
+        </pc:sldMkLst>
+        <pc:spChg chg="del">
+          <ac:chgData name="Abhishek Chitwar" userId="538a3118-df36-42bc-a284-8b221ded21c1" providerId="ADAL" clId="{0ADA3548-78A1-4B73-806C-37D99AB3624A}" dt="2024-03-26T16:54:44.829" v="41" actId="478"/>
+          <ac:spMkLst>
+            <pc:docMk/>
+            <pc:sldMk cId="2617764405" sldId="262"/>
+            <ac:spMk id="18" creationId="{BDC3F811-B4B7-6306-FB54-8640558030E4}"/>
+          </ac:spMkLst>
+        </pc:spChg>
+        <pc:spChg chg="add mod">
+          <ac:chgData name="Abhishek Chitwar" userId="538a3118-df36-42bc-a284-8b221ded21c1" providerId="ADAL" clId="{0ADA3548-78A1-4B73-806C-37D99AB3624A}" dt="2024-03-26T16:55:57.103" v="48" actId="1076"/>
+          <ac:spMkLst>
+            <pc:docMk/>
+            <pc:sldMk cId="2617764405" sldId="262"/>
+            <ac:spMk id="22" creationId="{B79F84DC-E44C-B6F1-BA0B-0D643FF0742D}"/>
+          </ac:spMkLst>
+        </pc:spChg>
+        <pc:spChg chg="add mod">
+          <ac:chgData name="Abhishek Chitwar" userId="538a3118-df36-42bc-a284-8b221ded21c1" providerId="ADAL" clId="{0ADA3548-78A1-4B73-806C-37D99AB3624A}" dt="2024-03-26T16:55:32.088" v="45" actId="1076"/>
+          <ac:spMkLst>
+            <pc:docMk/>
+            <pc:sldMk cId="2617764405" sldId="262"/>
+            <ac:spMk id="23" creationId="{6DD9E3A1-56EC-B1B4-C0C3-DFFD2D1E27EA}"/>
+          </ac:spMkLst>
+        </pc:spChg>
+        <pc:spChg chg="add mod">
+          <ac:chgData name="Abhishek Chitwar" userId="538a3118-df36-42bc-a284-8b221ded21c1" providerId="ADAL" clId="{0ADA3548-78A1-4B73-806C-37D99AB3624A}" dt="2024-03-26T16:55:44.311" v="47" actId="1076"/>
+          <ac:spMkLst>
+            <pc:docMk/>
+            <pc:sldMk cId="2617764405" sldId="262"/>
+            <ac:spMk id="24" creationId="{ED0ECA09-AB0B-40AE-8333-BB759AF3AB7A}"/>
+          </ac:spMkLst>
+        </pc:spChg>
+        <pc:spChg chg="add mod">
+          <ac:chgData name="Abhishek Chitwar" userId="538a3118-df36-42bc-a284-8b221ded21c1" providerId="ADAL" clId="{0ADA3548-78A1-4B73-806C-37D99AB3624A}" dt="2024-03-26T16:56:46.145" v="53" actId="1076"/>
+          <ac:spMkLst>
+            <pc:docMk/>
+            <pc:sldMk cId="2617764405" sldId="262"/>
+            <ac:spMk id="25" creationId="{3BF79E7C-6D83-6E26-9272-C23AE45EC2C8}"/>
+          </ac:spMkLst>
+        </pc:spChg>
+        <pc:spChg chg="mod">
+          <ac:chgData name="Abhishek Chitwar" userId="538a3118-df36-42bc-a284-8b221ded21c1" providerId="ADAL" clId="{0ADA3548-78A1-4B73-806C-37D99AB3624A}" dt="2024-03-26T16:59:07.595" v="78" actId="20577"/>
+          <ac:spMkLst>
+            <pc:docMk/>
+            <pc:sldMk cId="2617764405" sldId="262"/>
+            <ac:spMk id="26" creationId="{E7BB3498-0C83-C240-38FF-7526E59DE37D}"/>
+          </ac:spMkLst>
+        </pc:spChg>
+      </pc:sldChg>
+    </pc:docChg>
+  </pc:docChgLst>
+</pc:chgInfo>
 </file>
 
 <file path=ppt/handoutMasters/handoutMaster1.xml><?xml version="1.0" encoding="utf-8"?>
@@ -221,7 +513,7 @@
           <a:p>
             <a:fld id="{F34353FF-EAC3-4F79-ABDE-C6361A181A4C}" type="datetimeFigureOut">
               <a:rPr lang="en-US" smtClean="0"/>
-              <a:t>5/14/2024</a:t>
+              <a:t>5/15/2024</a:t>
             </a:fld>
             <a:endParaRPr lang="en-US"/>
           </a:p>
@@ -386,7 +678,7 @@
           <a:p>
             <a:fld id="{9BCAF6CE-61AA-41F6-A4C8-3489C6D2454E}" type="datetimeFigureOut">
               <a:rPr lang="en-US" smtClean="0"/>
-              <a:t>5/14/2024</a:t>
+              <a:t>5/15/2024</a:t>
             </a:fld>
             <a:endParaRPr lang="en-US"/>
           </a:p>
@@ -871,7 +1163,7 @@
               <a:bodyPr rtlCol="0" anchor="ctr"/>
               <a:lstStyle/>
               <a:p>
-                <a:endParaRPr lang="en-US"/>
+                <a:endParaRPr lang="en-US" dirty="0"/>
               </a:p>
             </p:txBody>
           </p:sp>
@@ -2997,7 +3289,7 @@
               <a:bodyPr rtlCol="0" anchor="ctr"/>
               <a:lstStyle/>
               <a:p>
-                <a:endParaRPr lang="en-US"/>
+                <a:endParaRPr lang="en-US" dirty="0"/>
               </a:p>
             </p:txBody>
           </p:sp>
@@ -9406,7 +9698,7 @@
           <a:p>
             <a:pPr algn="ctr"/>
             <a:r>
-              <a:rPr lang="en-US" sz="1000">
+              <a:rPr lang="en-US" sz="1000" dirty="0">
                 <a:solidFill>
                   <a:srgbClr val="999999"/>
                 </a:solidFill>
@@ -9422,7 +9714,7 @@
               <a:t>2024</a:t>
             </a:fld>
             <a:r>
-              <a:rPr lang="en-US" sz="1000">
+              <a:rPr lang="en-US" sz="1000" dirty="0">
                 <a:solidFill>
                   <a:srgbClr val="999999"/>
                 </a:solidFill>
@@ -9464,6 +9756,7 @@
               <a:rPr lang="en-US"/>
               <a:t>Click to edit Master title style</a:t>
             </a:r>
+            <a:endParaRPr lang="en-US" dirty="0"/>
           </a:p>
         </p:txBody>
       </p:sp>
@@ -9532,6 +9825,7 @@
               <a:rPr lang="en-US"/>
               <a:t>Click to edit Master subtitle style</a:t>
             </a:r>
+            <a:endParaRPr lang="en-US" dirty="0"/>
           </a:p>
         </p:txBody>
       </p:sp>
@@ -9557,7 +9851,7 @@
           <a:p>
             <a:fld id="{0AB78C0B-3A02-4D46-A528-C519CB518F3E}" type="datetime5">
               <a:rPr lang="en-US" smtClean="0"/>
-              <a:t>14-May-24</a:t>
+              <a:t>15-May-24</a:t>
             </a:fld>
             <a:endParaRPr lang="en-US"/>
           </a:p>
@@ -9741,6 +10035,7 @@
               <a:rPr lang="en-US"/>
               <a:t>Fifth level</a:t>
             </a:r>
+            <a:endParaRPr lang="en-US" dirty="0"/>
           </a:p>
         </p:txBody>
       </p:sp>
@@ -9833,6 +10128,7 @@
               <a:rPr lang="en-US"/>
               <a:t>Fifth level</a:t>
             </a:r>
+            <a:endParaRPr lang="en-US" dirty="0"/>
           </a:p>
         </p:txBody>
       </p:sp>
@@ -9925,6 +10221,7 @@
               <a:rPr lang="en-US"/>
               <a:t>Fifth level</a:t>
             </a:r>
+            <a:endParaRPr lang="en-US" dirty="0"/>
           </a:p>
         </p:txBody>
       </p:sp>
@@ -9951,7 +10248,7 @@
           <a:p>
             <a:fld id="{E44BBCB2-CF6A-0645-828D-E7B1FDEFB2AA}" type="datetime5">
               <a:rPr lang="en-US" smtClean="0"/>
-              <a:t>14-May-24</a:t>
+              <a:t>15-May-24</a:t>
             </a:fld>
             <a:endParaRPr lang="en-US"/>
           </a:p>
@@ -10316,7 +10613,7 @@
           <a:lstStyle/>
           <a:p>
             <a:r>
-              <a:rPr lang="en-US" sz="1600" b="1" i="1"/>
+              <a:rPr lang="en-US" sz="1600" b="1" i="1" dirty="0"/>
               <a:t>Challenge</a:t>
             </a:r>
           </a:p>
@@ -10351,7 +10648,7 @@
           <a:lstStyle/>
           <a:p>
             <a:r>
-              <a:rPr lang="en-US" sz="1600" b="1" i="1"/>
+              <a:rPr lang="en-US" sz="1600" b="1" i="1" dirty="0"/>
               <a:t>Solution</a:t>
             </a:r>
           </a:p>
@@ -10386,7 +10683,7 @@
           <a:lstStyle/>
           <a:p>
             <a:r>
-              <a:rPr lang="en-US" sz="1600" b="1" i="1"/>
+              <a:rPr lang="en-US" sz="1600" b="1" i="1" dirty="0"/>
               <a:t>Benefits</a:t>
             </a:r>
           </a:p>
@@ -10489,6 +10786,7 @@
               <a:rPr lang="en-US"/>
               <a:t>Click icon to add picture</a:t>
             </a:r>
+            <a:endParaRPr lang="en-US" dirty="0"/>
           </a:p>
         </p:txBody>
       </p:sp>
@@ -10586,7 +10884,7 @@
           <a:p>
             <a:fld id="{EA20B271-05B2-F144-841B-FCB7A32B93DF}" type="datetimeFigureOut">
               <a:rPr lang="en-US" smtClean="0"/>
-              <a:t>5/14/2024</a:t>
+              <a:t>5/15/2024</a:t>
             </a:fld>
             <a:endParaRPr lang="en-US"/>
           </a:p>
@@ -10824,6 +11122,7 @@
               <a:rPr lang="en-US"/>
               <a:t>Fifth level</a:t>
             </a:r>
+            <a:endParaRPr lang="en-US" dirty="0"/>
           </a:p>
         </p:txBody>
       </p:sp>
@@ -10967,7 +11266,7 @@
           <a:p>
             <a:fld id="{2243FEE4-0413-3A4E-AD64-5842177E1AD4}" type="datetime5">
               <a:rPr lang="en-US" smtClean="0"/>
-              <a:t>14-May-24</a:t>
+              <a:t>15-May-24</a:t>
             </a:fld>
             <a:endParaRPr lang="en-US"/>
           </a:p>
@@ -11166,7 +11465,7 @@
           <a:p>
             <a:fld id="{58444D17-B5BF-6849-A82F-EAB971E719A4}" type="datetime5">
               <a:rPr lang="en-US" smtClean="0"/>
-              <a:t>14-May-24</a:t>
+              <a:t>15-May-24</a:t>
             </a:fld>
             <a:endParaRPr lang="en-US"/>
           </a:p>
@@ -11347,7 +11646,7 @@
           <a:p>
             <a:fld id="{7A43194D-9DAD-C94D-AF80-DBCFB0B1EC62}" type="datetime5">
               <a:rPr lang="en-US" smtClean="0"/>
-              <a:t>14-May-24</a:t>
+              <a:t>15-May-24</a:t>
             </a:fld>
             <a:endParaRPr lang="en-US"/>
           </a:p>
@@ -11451,7 +11750,7 @@
           <a:p>
             <a:fld id="{D45D651A-A98F-144B-B9E9-E9B8924B6800}" type="datetime5">
               <a:rPr lang="en-US" smtClean="0"/>
-              <a:t>14-May-24</a:t>
+              <a:t>15-May-24</a:t>
             </a:fld>
             <a:endParaRPr lang="en-US"/>
           </a:p>
@@ -12812,7 +13111,7 @@
               <a:bodyPr rtlCol="0" anchor="ctr"/>
               <a:lstStyle/>
               <a:p>
-                <a:endParaRPr lang="en-US"/>
+                <a:endParaRPr lang="en-US" dirty="0"/>
               </a:p>
             </p:txBody>
           </p:sp>
@@ -13081,7 +13380,7 @@
               <a:bodyPr rtlCol="0" anchor="ctr"/>
               <a:lstStyle/>
               <a:p>
-                <a:endParaRPr lang="en-US"/>
+                <a:endParaRPr lang="en-US" dirty="0"/>
               </a:p>
             </p:txBody>
           </p:sp>
@@ -13342,7 +13641,7 @@
               <a:bodyPr rtlCol="0" anchor="ctr"/>
               <a:lstStyle/>
               <a:p>
-                <a:endParaRPr lang="en-US"/>
+                <a:endParaRPr lang="en-US" dirty="0"/>
               </a:p>
             </p:txBody>
           </p:sp>
@@ -21683,7 +21982,7 @@
           <a:p>
             <a:fld id="{0AB78C0B-3A02-4D46-A528-C519CB518F3E}" type="datetime5">
               <a:rPr lang="en-US" smtClean="0"/>
-              <a:t>14-May-24</a:t>
+              <a:t>15-May-24</a:t>
             </a:fld>
             <a:endParaRPr lang="en-US"/>
           </a:p>
@@ -21780,6 +22079,7 @@
               <a:rPr lang="en-US"/>
               <a:t>Click to edit Master title style</a:t>
             </a:r>
+            <a:endParaRPr lang="en-US" dirty="0"/>
           </a:p>
         </p:txBody>
       </p:sp>
@@ -21848,6 +22148,7 @@
               <a:rPr lang="en-US"/>
               <a:t>Click to edit Master subtitle style</a:t>
             </a:r>
+            <a:endParaRPr lang="en-US" dirty="0"/>
           </a:p>
         </p:txBody>
       </p:sp>
@@ -21881,7 +22182,7 @@
           <a:p>
             <a:pPr algn="ctr"/>
             <a:r>
-              <a:rPr lang="en-US" sz="1000">
+              <a:rPr lang="en-US" sz="1000" dirty="0">
                 <a:solidFill>
                   <a:srgbClr val="999999"/>
                 </a:solidFill>
@@ -21897,7 +22198,7 @@
               <a:t>2024</a:t>
             </a:fld>
             <a:r>
-              <a:rPr lang="en-US" sz="1000">
+              <a:rPr lang="en-US" sz="1000" dirty="0">
                 <a:solidFill>
                   <a:srgbClr val="999999"/>
                 </a:solidFill>
@@ -22054,6 +22355,7 @@
               <a:rPr lang="en-US"/>
               <a:t>Fifth level</a:t>
             </a:r>
+            <a:endParaRPr lang="en-US" dirty="0"/>
           </a:p>
         </p:txBody>
       </p:sp>
@@ -22080,7 +22382,7 @@
           <a:p>
             <a:fld id="{7E4BBA83-940A-D344-8476-F6C53B5C9486}" type="datetime5">
               <a:rPr lang="en-US" smtClean="0"/>
-              <a:t>14-May-24</a:t>
+              <a:t>15-May-24</a:t>
             </a:fld>
             <a:endParaRPr lang="en-US"/>
           </a:p>
@@ -22291,6 +22593,7 @@
               <a:rPr lang="en-US"/>
               <a:t>Fifth level</a:t>
             </a:r>
+            <a:endParaRPr lang="en-US" dirty="0"/>
           </a:p>
         </p:txBody>
       </p:sp>
@@ -22384,6 +22687,7 @@
               <a:rPr lang="en-US"/>
               <a:t>Fifth level</a:t>
             </a:r>
+            <a:endParaRPr lang="en-US" dirty="0"/>
           </a:p>
         </p:txBody>
       </p:sp>
@@ -22404,7 +22708,7 @@
           <a:p>
             <a:fld id="{6010E587-7CF6-0747-A550-7B374EB5355C}" type="datetime5">
               <a:rPr lang="en-US" smtClean="0"/>
-              <a:t>14-May-24</a:t>
+              <a:t>15-May-24</a:t>
             </a:fld>
             <a:endParaRPr lang="en-US"/>
           </a:p>
@@ -22529,7 +22833,7 @@
           <a:p>
             <a:fld id="{356A771A-8E39-E44C-A8DD-E28422034FF9}" type="datetime5">
               <a:rPr lang="en-US" smtClean="0"/>
-              <a:t>14-May-24</a:t>
+              <a:t>15-May-24</a:t>
             </a:fld>
             <a:endParaRPr lang="en-US"/>
           </a:p>
@@ -22629,6 +22933,7 @@
               <a:rPr lang="en-US"/>
               <a:t>Click to edit Master title style</a:t>
             </a:r>
+            <a:endParaRPr lang="en-US" dirty="0"/>
           </a:p>
         </p:txBody>
       </p:sp>
@@ -22685,6 +22990,7 @@
               <a:rPr lang="en-US"/>
               <a:t>Fifth level</a:t>
             </a:r>
+            <a:endParaRPr lang="en-US" dirty="0"/>
           </a:p>
         </p:txBody>
       </p:sp>
@@ -22711,7 +23017,7 @@
           <a:p>
             <a:fld id="{7E4BBA83-940A-D344-8476-F6C53B5C9486}" type="datetime5">
               <a:rPr lang="en-US" smtClean="0"/>
-              <a:t>14-May-24</a:t>
+              <a:t>15-May-24</a:t>
             </a:fld>
             <a:endParaRPr lang="en-US"/>
           </a:p>
@@ -22827,7 +23133,7 @@
           <a:p>
             <a:fld id="{B79BA577-6254-4649-8698-3C8B0CC7B2C3}" type="datetime5">
               <a:rPr lang="en-US" smtClean="0"/>
-              <a:t>14-May-24</a:t>
+              <a:t>15-May-24</a:t>
             </a:fld>
             <a:endParaRPr lang="en-US"/>
           </a:p>
@@ -22936,7 +23242,7 @@
           <a:p>
             <a:fld id="{D45D651A-A98F-144B-B9E9-E9B8924B6800}" type="datetime5">
               <a:rPr lang="en-US" smtClean="0"/>
-              <a:t>14-May-24</a:t>
+              <a:t>15-May-24</a:t>
             </a:fld>
             <a:endParaRPr lang="en-US"/>
           </a:p>
@@ -24520,6 +24826,7 @@
               <a:rPr lang="en-US"/>
               <a:t>Fifth level</a:t>
             </a:r>
+            <a:endParaRPr lang="en-US" dirty="0"/>
           </a:p>
         </p:txBody>
       </p:sp>
@@ -24576,6 +24883,7 @@
               <a:rPr lang="en-US"/>
               <a:t>Fifth level</a:t>
             </a:r>
+            <a:endParaRPr lang="en-US" dirty="0"/>
           </a:p>
         </p:txBody>
       </p:sp>
@@ -24596,7 +24904,7 @@
           <a:p>
             <a:fld id="{6010E587-7CF6-0747-A550-7B374EB5355C}" type="datetime5">
               <a:rPr lang="en-US" smtClean="0"/>
-              <a:t>14-May-24</a:t>
+              <a:t>15-May-24</a:t>
             </a:fld>
             <a:endParaRPr lang="en-US"/>
           </a:p>
@@ -24746,6 +25054,7 @@
               <a:rPr lang="en-US"/>
               <a:t>Fifth level</a:t>
             </a:r>
+            <a:endParaRPr lang="en-US" dirty="0"/>
           </a:p>
         </p:txBody>
       </p:sp>
@@ -24916,7 +25225,7 @@
           <a:p>
             <a:fld id="{A00C5283-2AC5-7848-863C-76C291E9D333}" type="datetime5">
               <a:rPr lang="en-US" smtClean="0"/>
-              <a:t>14-May-24</a:t>
+              <a:t>15-May-24</a:t>
             </a:fld>
             <a:endParaRPr lang="en-US"/>
           </a:p>
@@ -25107,6 +25416,7 @@
               <a:rPr lang="en-US"/>
               <a:t>Fifth level</a:t>
             </a:r>
+            <a:endParaRPr lang="en-US" dirty="0"/>
           </a:p>
         </p:txBody>
       </p:sp>
@@ -25277,7 +25587,7 @@
           <a:p>
             <a:fld id="{E44BBCB2-CF6A-0645-828D-E7B1FDEFB2AA}" type="datetime5">
               <a:rPr lang="en-US" smtClean="0"/>
-              <a:t>14-May-24</a:t>
+              <a:t>15-May-24</a:t>
             </a:fld>
             <a:endParaRPr lang="en-US"/>
           </a:p>
@@ -25516,7 +25826,7 @@
           <a:p>
             <a:fld id="{356A771A-8E39-E44C-A8DD-E28422034FF9}" type="datetime5">
               <a:rPr lang="en-US" smtClean="0"/>
-              <a:t>14-May-24</a:t>
+              <a:t>15-May-24</a:t>
             </a:fld>
             <a:endParaRPr lang="en-US"/>
           </a:p>
@@ -25614,7 +25924,7 @@
           <a:p>
             <a:fld id="{B79BA577-6254-4649-8698-3C8B0CC7B2C3}" type="datetime5">
               <a:rPr lang="en-US" smtClean="0"/>
-              <a:t>14-May-24</a:t>
+              <a:t>15-May-24</a:t>
             </a:fld>
             <a:endParaRPr lang="en-US"/>
           </a:p>
@@ -27104,6 +27414,7 @@
               <a:rPr lang="en-US"/>
               <a:t>Click to edit Master title style</a:t>
             </a:r>
+            <a:endParaRPr lang="en-US" dirty="0"/>
           </a:p>
         </p:txBody>
       </p:sp>
@@ -27241,7 +27552,7 @@
           <a:p>
             <a:fld id="{BC55155B-809E-C143-822C-E7956EE070A4}" type="datetime5">
               <a:rPr lang="en-US" smtClean="0"/>
-              <a:t>14-May-24</a:t>
+              <a:t>15-May-24</a:t>
             </a:fld>
             <a:endParaRPr lang="en-US"/>
           </a:p>
@@ -27322,7 +27633,7 @@
           <a:p>
             <a:pPr algn="ctr"/>
             <a:r>
-              <a:rPr lang="en-US" sz="1000">
+              <a:rPr lang="en-US" sz="1000" dirty="0">
                 <a:solidFill>
                   <a:srgbClr val="999999"/>
                 </a:solidFill>
@@ -27338,7 +27649,7 @@
               <a:t>2024</a:t>
             </a:fld>
             <a:r>
-              <a:rPr lang="en-US" sz="1000">
+              <a:rPr lang="en-US" sz="1000" dirty="0">
                 <a:solidFill>
                   <a:srgbClr val="999999"/>
                 </a:solidFill>
@@ -27438,35 +27749,35 @@
           <a:p>
             <a:pPr lvl="0"/>
             <a:r>
-              <a:rPr lang="en-US"/>
+              <a:rPr lang="en-US" dirty="0"/>
               <a:t>Edit Master text styles</a:t>
             </a:r>
           </a:p>
           <a:p>
             <a:pPr lvl="1"/>
             <a:r>
-              <a:rPr lang="en-US"/>
+              <a:rPr lang="en-US" dirty="0"/>
               <a:t>Second level</a:t>
             </a:r>
           </a:p>
           <a:p>
             <a:pPr lvl="2"/>
             <a:r>
-              <a:rPr lang="en-US"/>
+              <a:rPr lang="en-US" dirty="0"/>
               <a:t>Third level</a:t>
             </a:r>
           </a:p>
           <a:p>
             <a:pPr lvl="3"/>
             <a:r>
-              <a:rPr lang="en-US"/>
+              <a:rPr lang="en-US" dirty="0"/>
               <a:t>Fourth level</a:t>
             </a:r>
           </a:p>
           <a:p>
             <a:pPr lvl="4"/>
             <a:r>
-              <a:rPr lang="en-US"/>
+              <a:rPr lang="en-US" dirty="0"/>
               <a:t>Fifth level</a:t>
             </a:r>
           </a:p>
@@ -27489,7 +27800,7 @@
           <a:p>
             <a:fld id="{977D4567-BF14-1F43-9BEF-21FFE7684913}" type="datetime5">
               <a:rPr lang="en-US" smtClean="0"/>
-              <a:t>14-May-24</a:t>
+              <a:t>15-May-24</a:t>
             </a:fld>
             <a:endParaRPr lang="en-US"/>
           </a:p>
@@ -27604,6 +27915,7 @@
               <a:rPr lang="en-US"/>
               <a:t>Click to edit Master title style</a:t>
             </a:r>
+            <a:endParaRPr lang="en-US" dirty="0"/>
           </a:p>
         </p:txBody>
       </p:sp>
@@ -27745,6 +28057,7 @@
               <a:rPr lang="en-US"/>
               <a:t>Fifth level</a:t>
             </a:r>
+            <a:endParaRPr lang="en-US" dirty="0"/>
           </a:p>
         </p:txBody>
       </p:sp>
@@ -27784,7 +28097,7 @@
             <a:fld id="{04527C26-5E7D-7B48-9E3D-0BC76EDD2840}" type="datetime5">
               <a:rPr lang="en-US" smtClean="0"/>
               <a:pPr/>
-              <a:t>14-May-24</a:t>
+              <a:t>15-May-24</a:t>
             </a:fld>
             <a:endParaRPr lang="en-US"/>
           </a:p>
@@ -27910,7 +28223,7 @@
               <a:pPr algn="l"/>
               <a:t>‹#›</a:t>
             </a:fld>
-            <a:endParaRPr lang="en-US" sz="1000">
+            <a:endParaRPr lang="en-US" sz="1000" dirty="0">
               <a:solidFill>
                 <a:srgbClr val="999999"/>
               </a:solidFill>
@@ -28043,7 +28356,7 @@
           <a:p>
             <a:pPr algn="l"/>
             <a:r>
-              <a:rPr lang="en-US" sz="900">
+              <a:rPr lang="en-US" sz="900" dirty="0">
                 <a:solidFill>
                   <a:srgbClr val="999999"/>
                 </a:solidFill>
@@ -28059,7 +28372,7 @@
               <a:t>2024</a:t>
             </a:fld>
             <a:r>
-              <a:rPr lang="en-US" sz="900">
+              <a:rPr lang="en-US" sz="900" dirty="0">
                 <a:solidFill>
                   <a:srgbClr val="999999"/>
                 </a:solidFill>
@@ -28265,7 +28578,7 @@
               <a:bodyPr rtlCol="0" anchor="ctr"/>
               <a:lstStyle/>
               <a:p>
-                <a:endParaRPr lang="en-US"/>
+                <a:endParaRPr lang="en-US" dirty="0"/>
               </a:p>
             </p:txBody>
           </p:sp>
@@ -36819,7 +37132,7 @@
           <a:lstStyle/>
           <a:p>
             <a:r>
-              <a:rPr lang="en-US"/>
+              <a:rPr lang="en-US" dirty="0"/>
               <a:t>Ansys Python Manager</a:t>
             </a:r>
           </a:p>
@@ -36847,7 +37160,7 @@
           <a:lstStyle/>
           <a:p>
             <a:r>
-              <a:rPr lang="en-US">
+              <a:rPr lang="en-US" dirty="0">
                 <a:latin typeface="+mj-lt"/>
               </a:rPr>
               <a:t>PyCon India 2024</a:t>
@@ -36907,7 +37220,7 @@
           <a:lstStyle/>
           <a:p>
             <a:r>
-              <a:rPr lang="en-US"/>
+              <a:rPr lang="en-US" dirty="0"/>
               <a:t>Outline</a:t>
             </a:r>
           </a:p>
@@ -36931,9 +37244,7 @@
         </p:nvSpPr>
         <p:spPr/>
         <p:txBody>
-          <a:bodyPr vert="horz" lIns="45720" tIns="0" rIns="0" bIns="0" rtlCol="0" anchor="t">
-            <a:noAutofit/>
-          </a:bodyPr>
+          <a:bodyPr/>
           <a:lstStyle/>
           <a:p>
             <a:pPr>
@@ -36965,12 +37276,6 @@
               </a:rPr>
               <a:t>Necessity for a solution</a:t>
             </a:r>
-            <a:endParaRPr lang="en-US" dirty="0">
-              <a:solidFill>
-                <a:srgbClr val="000000"/>
-              </a:solidFill>
-              <a:cs typeface="Calibri"/>
-            </a:endParaRPr>
           </a:p>
           <a:p>
             <a:pPr>
@@ -36987,13 +37292,6 @@
               </a:rPr>
               <a:t>Introduction to Ansys Python Manager</a:t>
             </a:r>
-            <a:endParaRPr lang="en-US" i="0" dirty="0">
-              <a:solidFill>
-                <a:srgbClr val="000000"/>
-              </a:solidFill>
-              <a:effectLst/>
-              <a:cs typeface="Calibri"/>
-            </a:endParaRPr>
           </a:p>
           <a:p>
             <a:pPr>
@@ -37009,28 +37307,6 @@
               </a:rPr>
               <a:t>Live Demo &amp; Tips &amp; Tricks</a:t>
             </a:r>
-            <a:endParaRPr lang="en-US" dirty="0">
-              <a:solidFill>
-                <a:srgbClr val="000000"/>
-              </a:solidFill>
-              <a:cs typeface="Calibri"/>
-            </a:endParaRPr>
-          </a:p>
-          <a:p>
-            <a:pPr>
-              <a:lnSpc>
-                <a:spcPct val="150000"/>
-              </a:lnSpc>
-            </a:pPr>
-            <a:r>
-              <a:rPr lang="en-US" dirty="0">
-                <a:solidFill>
-                  <a:srgbClr val="000000"/>
-                </a:solidFill>
-                <a:cs typeface="Calibri"/>
-              </a:rPr>
-              <a:t>Q&amp;A</a:t>
-            </a:r>
           </a:p>
           <a:p>
             <a:pPr marL="0" indent="0">
@@ -37039,22 +37315,23 @@
               </a:lnSpc>
               <a:buNone/>
             </a:pPr>
-            <a:endParaRPr lang="en-US" i="0">
+            <a:endParaRPr lang="en-US" dirty="0">
+              <a:solidFill>
+                <a:srgbClr val="000000"/>
+              </a:solidFill>
+            </a:endParaRPr>
+          </a:p>
+          <a:p>
+            <a:endParaRPr lang="en-US" i="0" dirty="0">
               <a:solidFill>
                 <a:srgbClr val="000000"/>
               </a:solidFill>
               <a:effectLst/>
-              <a:latin typeface="Calibri" panose="020F0502020204030204"/>
-              <a:cs typeface="Calibri" panose="020F0502020204030204"/>
-            </a:endParaRPr>
-          </a:p>
-          <a:p>
-            <a:endParaRPr lang="en-US">
               <a:latin typeface="Montserrat" panose="00000500000000000000" pitchFamily="2" charset="0"/>
             </a:endParaRPr>
           </a:p>
           <a:p>
-            <a:endParaRPr lang="en-US">
+            <a:endParaRPr lang="en-US" dirty="0">
               <a:latin typeface="Montserrat" panose="00000500000000000000" pitchFamily="2" charset="0"/>
             </a:endParaRPr>
           </a:p>
@@ -37119,7 +37396,7 @@
           <a:lstStyle/>
           <a:p>
             <a:r>
-              <a:rPr lang="en-US"/>
+              <a:rPr lang="en-US" dirty="0"/>
               <a:t>What is Ansys Python Manager?</a:t>
             </a:r>
           </a:p>
@@ -37144,30 +37421,30 @@
         <p:spPr>
           <a:xfrm>
             <a:off x="609600" y="1295400"/>
-            <a:ext cx="5485406" cy="4810496"/>
+            <a:ext cx="5257796" cy="4800600"/>
           </a:xfrm>
         </p:spPr>
         <p:txBody>
-          <a:bodyPr vert="horz" lIns="45720" tIns="0" rIns="0" bIns="0" rtlCol="0" anchor="t">
+          <a:bodyPr>
             <a:normAutofit fontScale="92500" lnSpcReduction="20000"/>
           </a:bodyPr>
           <a:lstStyle/>
           <a:p>
             <a:pPr marL="571500" indent="-342900"/>
             <a:r>
-              <a:rPr lang="en-US" b="0" i="0">
+              <a:rPr lang="en-US" b="0" i="0" dirty="0">
                 <a:effectLst/>
               </a:rPr>
               <a:t>Collaborative </a:t>
             </a:r>
             <a:r>
-              <a:rPr lang="en-US" b="1" i="0">
+              <a:rPr lang="en-US" b="1" i="0" dirty="0">
                 <a:effectLst/>
               </a:rPr>
               <a:t>open-source Python QT </a:t>
             </a:r>
             <a:r>
-              <a:rPr lang="en-US" b="0" i="0">
+              <a:rPr lang="en-US" b="0" i="0" dirty="0">
                 <a:effectLst/>
               </a:rPr>
               <a:t>app</a:t>
@@ -37191,20 +37468,12 @@
               <a:rPr lang="en-US" b="0" i="0" dirty="0">
                 <a:effectLst/>
               </a:rPr>
-              <a:t> Python users</a:t>
+              <a:t> Python users </a:t>
             </a:r>
-            <a:r>
-              <a:rPr lang="en-US" dirty="0"/>
-              <a:t> </a:t>
-            </a:r>
-            <a:endParaRPr lang="en-US" b="0" i="0" dirty="0">
-              <a:effectLst/>
-              <a:cs typeface="Calibri"/>
-            </a:endParaRPr>
           </a:p>
           <a:p>
             <a:pPr marL="571500" indent="-342900"/>
-            <a:endParaRPr lang="en-US" b="0" i="0">
+            <a:endParaRPr lang="en-US" b="0" i="0" dirty="0">
               <a:effectLst/>
             </a:endParaRPr>
           </a:p>
@@ -37216,10 +37485,6 @@
               </a:rPr>
               <a:t>Key Features</a:t>
             </a:r>
-            <a:endParaRPr lang="en-US" b="1" i="0" dirty="0">
-              <a:effectLst/>
-              <a:cs typeface="Calibri"/>
-            </a:endParaRPr>
           </a:p>
           <a:p>
             <a:pPr lvl="2">
@@ -37254,13 +37519,6 @@
               </a:rPr>
               <a:t> usage</a:t>
             </a:r>
-            <a:endParaRPr lang="en-US" sz="2400" b="0" i="0" dirty="0">
-              <a:solidFill>
-                <a:schemeClr val="tx1"/>
-              </a:solidFill>
-              <a:effectLst/>
-              <a:cs typeface="Calibri"/>
-            </a:endParaRPr>
           </a:p>
           <a:p>
             <a:pPr lvl="2">
@@ -37269,7 +37527,7 @@
               </a:lnSpc>
             </a:pPr>
             <a:r>
-              <a:rPr lang="en-US" sz="2400" b="0" i="0">
+              <a:rPr lang="en-US" sz="2400" b="0" i="0" dirty="0">
                 <a:solidFill>
                   <a:schemeClr val="tx1"/>
                 </a:solidFill>
@@ -37278,7 +37536,7 @@
               <a:t>Simplifies </a:t>
             </a:r>
             <a:r>
-              <a:rPr lang="en-US" sz="2400" b="1" i="0">
+              <a:rPr lang="en-US" sz="2400" b="1" i="0" dirty="0">
                 <a:solidFill>
                   <a:schemeClr val="tx1"/>
                 </a:solidFill>
@@ -37287,7 +37545,7 @@
               <a:t>virtual environment </a:t>
             </a:r>
             <a:r>
-              <a:rPr lang="en-US" sz="2400" b="0" i="0">
+              <a:rPr lang="en-US" sz="2400" b="0" i="0" dirty="0">
                 <a:solidFill>
                   <a:schemeClr val="tx1"/>
                 </a:solidFill>
@@ -37312,22 +37570,13 @@
               <a:t>Facilitates </a:t>
             </a:r>
             <a:r>
-              <a:rPr lang="en-US" sz="2400" b="1" i="0" dirty="0" err="1">
-                <a:solidFill>
-                  <a:schemeClr val="tx1"/>
-                </a:solidFill>
-                <a:effectLst/>
-              </a:rPr>
-              <a:t>PyAnsys</a:t>
-            </a:r>
-            <a:r>
               <a:rPr lang="en-US" sz="2400" b="1" i="0" dirty="0">
                 <a:solidFill>
                   <a:schemeClr val="tx1"/>
                 </a:solidFill>
                 <a:effectLst/>
               </a:rPr>
-              <a:t> (open-source) </a:t>
+              <a:t>PyAnsys (open-source) </a:t>
             </a:r>
             <a:r>
               <a:rPr lang="en-US" sz="2400" b="0" i="0" dirty="0">
@@ -37338,21 +37587,6 @@
               </a:rPr>
               <a:t>package administration</a:t>
             </a:r>
-            <a:r>
-              <a:rPr lang="en-US" sz="2400" dirty="0">
-                <a:solidFill>
-                  <a:schemeClr val="tx1"/>
-                </a:solidFill>
-              </a:rPr>
-              <a:t>, easy access to documentation</a:t>
-            </a:r>
-            <a:endParaRPr lang="en-US" sz="2400" b="0" i="0" dirty="0">
-              <a:solidFill>
-                <a:schemeClr val="tx1"/>
-              </a:solidFill>
-              <a:effectLst/>
-              <a:cs typeface="Calibri"/>
-            </a:endParaRPr>
           </a:p>
           <a:p>
             <a:pPr lvl="2">
@@ -37381,29 +37615,27 @@
             <a:br>
               <a:rPr lang="en-US" dirty="0"/>
             </a:br>
-            <a:endParaRPr lang="en-US"/>
+            <a:endParaRPr lang="en-US" dirty="0"/>
           </a:p>
           <a:p>
-            <a:pPr marL="0" indent="0" algn="just">
+            <a:pPr marL="0" marR="0" indent="0" algn="just">
               <a:spcBef>
                 <a:spcPts val="0"/>
               </a:spcBef>
+              <a:spcAft>
+                <a:spcPts val="0"/>
+              </a:spcAft>
               <a:buNone/>
             </a:pPr>
             <a:r>
-              <a:rPr lang="en-US" sz="1300" dirty="0">
-                <a:latin typeface="Montserrat"/>
+              <a:rPr lang="en-US" sz="1300" b="0" dirty="0">
+                <a:effectLst/>
+                <a:latin typeface="Montserrat" panose="00000500000000000000" pitchFamily="2" charset="0"/>
                 <a:ea typeface="Montserrat" panose="00000500000000000000" pitchFamily="2" charset="0"/>
                 <a:cs typeface="Montserrat" panose="00000500000000000000" pitchFamily="2" charset="0"/>
               </a:rPr>
-              <a:t>  </a:t>
+              <a:t>  </a:t>
             </a:r>
-            <a:endParaRPr lang="en-US" sz="1300" b="0" dirty="0">
-              <a:effectLst/>
-              <a:latin typeface="Montserrat" panose="00000500000000000000" pitchFamily="2" charset="0"/>
-              <a:ea typeface="Montserrat" panose="00000500000000000000" pitchFamily="2" charset="0"/>
-              <a:cs typeface="Montserrat" panose="00000500000000000000" pitchFamily="2" charset="0"/>
-            </a:endParaRPr>
           </a:p>
           <a:p>
             <a:pPr marL="0" indent="0">
@@ -37412,7 +37644,7 @@
               </a:lnSpc>
               <a:buNone/>
             </a:pPr>
-            <a:endParaRPr lang="en-US"/>
+            <a:endParaRPr lang="en-US" dirty="0"/>
           </a:p>
         </p:txBody>
       </p:sp>
@@ -37485,7 +37717,7 @@
               <a:buNone/>
             </a:pPr>
             <a:r>
-              <a:rPr lang="en-US" sz="1100" b="0" u="sng">
+              <a:rPr lang="en-US" sz="1100" b="0" u="sng" dirty="0">
                 <a:solidFill>
                   <a:srgbClr val="0000FF"/>
                 </a:solidFill>
@@ -37498,7 +37730,7 @@
               <a:t>https://github.com/ansys/python-installer-qt-gui.git</a:t>
             </a:r>
             <a:r>
-              <a:rPr lang="en-US" sz="1100" b="0">
+              <a:rPr lang="en-US" sz="1100" b="0" dirty="0">
                 <a:effectLst/>
                 <a:latin typeface="Montserrat" panose="00000500000000000000" pitchFamily="2" charset="0"/>
                 <a:ea typeface="Montserrat" panose="00000500000000000000" pitchFamily="2" charset="0"/>
@@ -37507,7 +37739,7 @@
               <a:t> </a:t>
             </a:r>
             <a:r>
-              <a:rPr lang="en-US" sz="1100">
+              <a:rPr lang="en-US" sz="1100" dirty="0">
                 <a:solidFill>
                   <a:srgbClr val="0000FF"/>
                 </a:solidFill>
@@ -37529,7 +37761,7 @@
               <a:buNone/>
             </a:pPr>
             <a:r>
-              <a:rPr lang="en-US" sz="1100" b="0" u="sng">
+              <a:rPr lang="en-US" sz="1100" b="0" u="sng" dirty="0">
                 <a:solidFill>
                   <a:srgbClr val="0000FF"/>
                 </a:solidFill>
@@ -37541,7 +37773,7 @@
               </a:rPr>
               <a:t>Ansys Python Manager Documentation</a:t>
             </a:r>
-            <a:endParaRPr lang="en-US" sz="1100"/>
+            <a:endParaRPr lang="en-US" sz="1100" dirty="0"/>
           </a:p>
         </p:txBody>
       </p:sp>
@@ -37560,7 +37792,7 @@
           <p:nvPr/>
         </p:nvPicPr>
         <p:blipFill>
-          <a:blip r:embed="rId5" cstate="print">
+          <a:blip r:embed="rId5">
             <a:extLst>
               <a:ext uri="{28A0092B-C50C-407E-A947-70E740481C1C}">
                 <a14:useLocalDpi xmlns:a14="http://schemas.microsoft.com/office/drawing/2010/main" val="0"/>
@@ -37633,7 +37865,7 @@
           <a:lstStyle/>
           <a:p>
             <a:r>
-              <a:rPr lang="en-US"/>
+              <a:rPr lang="en-US" dirty="0"/>
               <a:t>Necessity for solution</a:t>
             </a:r>
           </a:p>
@@ -37670,7 +37902,7 @@
               <a:buChar char="•"/>
             </a:pPr>
             <a:r>
-              <a:rPr lang="en-US" b="0" i="0">
+              <a:rPr lang="en-US" b="0" i="0" dirty="0">
                 <a:solidFill>
                   <a:srgbClr val="323130"/>
                 </a:solidFill>
@@ -37685,7 +37917,7 @@
               <a:buChar char="•"/>
             </a:pPr>
             <a:r>
-              <a:rPr lang="en-US">
+              <a:rPr lang="en-US" dirty="0">
                 <a:solidFill>
                   <a:srgbClr val="323130"/>
                 </a:solidFill>
@@ -37693,14 +37925,14 @@
               <a:t>Commercialization of famous Python management tools are roadblock for community</a:t>
             </a:r>
             <a:br>
-              <a:rPr lang="en-US" b="0" i="0">
+              <a:rPr lang="en-US" b="0" i="0" dirty="0">
                 <a:solidFill>
                   <a:srgbClr val="323130"/>
                 </a:solidFill>
                 <a:effectLst/>
               </a:rPr>
             </a:br>
-            <a:endParaRPr lang="en-US" b="0" i="0">
+            <a:endParaRPr lang="en-US" b="0" i="0" dirty="0">
               <a:solidFill>
                 <a:srgbClr val="323130"/>
               </a:solidFill>
@@ -37713,7 +37945,7 @@
               <a:buChar char="•"/>
             </a:pPr>
             <a:r>
-              <a:rPr lang="en-US" b="0" i="0">
+              <a:rPr lang="en-US" b="0" i="0" dirty="0">
                 <a:solidFill>
                   <a:srgbClr val="323130"/>
                 </a:solidFill>
@@ -37722,7 +37954,7 @@
               <a:t>Based on the internal</a:t>
             </a:r>
             <a:r>
-              <a:rPr lang="en-US">
+              <a:rPr lang="en-US" dirty="0">
                 <a:solidFill>
                   <a:srgbClr val="323130"/>
                 </a:solidFill>
@@ -37736,7 +37968,7 @@
               <a:buChar char="•"/>
             </a:pPr>
             <a:r>
-              <a:rPr lang="en-US">
+              <a:rPr lang="en-US" dirty="0">
                 <a:solidFill>
                   <a:srgbClr val="323130"/>
                 </a:solidFill>
@@ -37750,7 +37982,7 @@
               <a:buChar char="•"/>
             </a:pPr>
             <a:r>
-              <a:rPr lang="en-US" b="0" i="0">
+              <a:rPr lang="en-US" b="0" i="0" dirty="0">
                 <a:solidFill>
                   <a:srgbClr val="323130"/>
                 </a:solidFill>
@@ -37765,7 +37997,7 @@
               <a:buChar char="•"/>
             </a:pPr>
             <a:r>
-              <a:rPr lang="en-US" b="0" i="0">
+              <a:rPr lang="en-US" b="0" i="0" dirty="0">
                 <a:solidFill>
                   <a:srgbClr val="323130"/>
                 </a:solidFill>
@@ -37779,14 +38011,14 @@
               <a:buNone/>
             </a:pPr>
             <a:br>
-              <a:rPr lang="en-US" b="0" i="0">
+              <a:rPr lang="en-US" b="0" i="0" dirty="0">
                 <a:solidFill>
                   <a:srgbClr val="323130"/>
                 </a:solidFill>
                 <a:effectLst/>
               </a:rPr>
             </a:br>
-            <a:endParaRPr lang="en-US"/>
+            <a:endParaRPr lang="en-US" dirty="0"/>
           </a:p>
         </p:txBody>
       </p:sp>
@@ -37849,7 +38081,7 @@
           <a:lstStyle/>
           <a:p>
             <a:r>
-              <a:rPr lang="en-US"/>
+              <a:rPr lang="en-US" dirty="0"/>
               <a:t>Introduction to Ansys Python Manager</a:t>
             </a:r>
           </a:p>
@@ -37873,19 +38105,20 @@
         </p:nvSpPr>
         <p:spPr>
           <a:xfrm>
-            <a:off x="609600" y="1295400"/>
-            <a:ext cx="5257796" cy="4800600"/>
+            <a:off x="609600" y="1066800"/>
+            <a:ext cx="5257796" cy="4876800"/>
           </a:xfrm>
         </p:spPr>
         <p:txBody>
-          <a:bodyPr vert="horz" lIns="45720" tIns="0" rIns="0" bIns="0" rtlCol="0" anchor="t">
-            <a:noAutofit/>
-          </a:bodyPr>
+          <a:bodyPr/>
           <a:lstStyle/>
           <a:p>
+            <a:pPr marL="0" indent="0">
+              <a:buNone/>
+            </a:pPr>
             <a:r>
               <a:rPr lang="en-US" dirty="0"/>
-              <a:t>One stop shop for </a:t>
+              <a:t>One stop shop for </a:t>
             </a:r>
           </a:p>
           <a:p>
@@ -37894,9 +38127,6 @@
               <a:rPr lang="en-US" dirty="0"/>
               <a:t>Getting started with Python</a:t>
             </a:r>
-            <a:endParaRPr lang="en-US" dirty="0">
-              <a:cs typeface="Calibri"/>
-            </a:endParaRPr>
           </a:p>
           <a:p>
             <a:pPr lvl="1"/>
@@ -37904,9 +38134,6 @@
               <a:rPr lang="en-US" dirty="0"/>
               <a:t>Install Python</a:t>
             </a:r>
-            <a:endParaRPr lang="en-US" dirty="0">
-              <a:cs typeface="Calibri"/>
-            </a:endParaRPr>
           </a:p>
           <a:p>
             <a:pPr lvl="1"/>
@@ -37914,9 +38141,6 @@
               <a:rPr lang="en-US" dirty="0"/>
               <a:t>Create Virtual Environment</a:t>
             </a:r>
-            <a:endParaRPr lang="en-US" dirty="0">
-              <a:cs typeface="Calibri"/>
-            </a:endParaRPr>
           </a:p>
           <a:p>
             <a:pPr lvl="1"/>
@@ -37924,448 +38148,171 @@
               <a:rPr lang="en-US" dirty="0"/>
               <a:t>Manage Virtual Environments</a:t>
             </a:r>
-            <a:endParaRPr lang="en-US" dirty="0">
-              <a:cs typeface="Calibri"/>
-            </a:endParaRPr>
           </a:p>
           <a:p>
             <a:r>
               <a:rPr lang="en-US" dirty="0"/>
-              <a:t>Launching IDE &amp; Console options</a:t>
+              <a:t>Launching options</a:t>
             </a:r>
-            <a:endParaRPr lang="en-US" dirty="0">
-              <a:cs typeface="Calibri"/>
-            </a:endParaRPr>
           </a:p>
           <a:p>
             <a:pPr lvl="1"/>
             <a:r>
-              <a:rPr lang="en-US" dirty="0">
+              <a:rPr lang="en-US" sz="2000" dirty="0">
                 <a:solidFill>
                   <a:schemeClr val="tx1"/>
                 </a:solidFill>
               </a:rPr>
               <a:t>Console</a:t>
             </a:r>
-            <a:endParaRPr lang="en-US" dirty="0">
-              <a:solidFill>
-                <a:schemeClr val="tx1"/>
-              </a:solidFill>
-              <a:cs typeface="Calibri"/>
-            </a:endParaRPr>
           </a:p>
           <a:p>
             <a:pPr lvl="1"/>
             <a:r>
-              <a:rPr lang="en-US" err="1">
+              <a:rPr lang="en-US" sz="2000" dirty="0">
                 <a:solidFill>
                   <a:schemeClr val="tx1"/>
                 </a:solidFill>
               </a:rPr>
               <a:t>JupyterLab</a:t>
             </a:r>
-            <a:endParaRPr lang="en-US" err="1">
-              <a:solidFill>
-                <a:schemeClr val="tx1"/>
-              </a:solidFill>
-              <a:cs typeface="Calibri"/>
-            </a:endParaRPr>
           </a:p>
           <a:p>
             <a:pPr lvl="1"/>
             <a:r>
-              <a:rPr lang="en-US" dirty="0" err="1">
+              <a:rPr lang="en-US" sz="2000" dirty="0">
                 <a:solidFill>
                   <a:schemeClr val="tx1"/>
                 </a:solidFill>
               </a:rPr>
-              <a:t>Jupyter</a:t>
+              <a:t>Jupyter Notebook</a:t>
             </a:r>
-            <a:r>
-              <a:rPr lang="en-US" dirty="0">
-                <a:solidFill>
-                  <a:schemeClr val="tx1"/>
-                </a:solidFill>
-              </a:rPr>
-              <a:t> Notebook</a:t>
-            </a:r>
-            <a:endParaRPr lang="en-US" dirty="0">
-              <a:solidFill>
-                <a:schemeClr val="tx1"/>
-              </a:solidFill>
-              <a:cs typeface="Calibri"/>
-            </a:endParaRPr>
           </a:p>
           <a:p>
             <a:pPr lvl="1"/>
             <a:r>
-              <a:rPr lang="en-US" dirty="0">
+              <a:rPr lang="en-US" sz="2000" dirty="0">
                 <a:solidFill>
                   <a:schemeClr val="tx1"/>
                 </a:solidFill>
               </a:rPr>
               <a:t>Spyder</a:t>
             </a:r>
+          </a:p>
+          <a:p>
+            <a:pPr lvl="1"/>
+            <a:r>
+              <a:rPr lang="en-US" sz="2000" dirty="0">
+                <a:solidFill>
+                  <a:schemeClr val="tx1"/>
+                </a:solidFill>
+              </a:rPr>
+              <a:t>VS Code</a:t>
+            </a:r>
             <a:br>
               <a:rPr lang="en-US" dirty="0"/>
             </a:br>
-            <a:endParaRPr lang="en-US"/>
+            <a:endParaRPr lang="en-US" dirty="0"/>
           </a:p>
         </p:txBody>
       </p:sp>
-      <p:grpSp>
-        <p:nvGrpSpPr>
-          <p:cNvPr id="14" name="Group 13">
+      <p:pic>
+        <p:nvPicPr>
+          <p:cNvPr id="15" name="Picture 2" descr="Screenshot of Python Installer application">
             <a:extLst>
               <a:ext uri="{FF2B5EF4-FFF2-40B4-BE49-F238E27FC236}">
-                <a16:creationId xmlns:a16="http://schemas.microsoft.com/office/drawing/2014/main" id="{40D8047C-8BEE-E638-83E1-C604383804BF}"/>
+                <a16:creationId xmlns:a16="http://schemas.microsoft.com/office/drawing/2014/main" id="{CDCD5ADC-3C33-6B1E-EB18-6FC2BC43483F}"/>
               </a:ext>
             </a:extLst>
           </p:cNvPr>
-          <p:cNvGrpSpPr/>
+          <p:cNvPicPr>
+            <a:picLocks noChangeAspect="1" noChangeArrowheads="1"/>
+          </p:cNvPicPr>
           <p:nvPr/>
-        </p:nvGrpSpPr>
-        <p:grpSpPr>
+        </p:nvPicPr>
+        <p:blipFill>
+          <a:blip r:embed="rId2" cstate="print">
+            <a:extLst>
+              <a:ext uri="{28A0092B-C50C-407E-A947-70E740481C1C}">
+                <a14:useLocalDpi xmlns:a14="http://schemas.microsoft.com/office/drawing/2010/main" val="0"/>
+              </a:ext>
+            </a:extLst>
+          </a:blip>
+          <a:srcRect/>
+          <a:stretch>
+            <a:fillRect/>
+          </a:stretch>
+        </p:blipFill>
+        <p:spPr bwMode="auto">
           <a:xfrm>
             <a:off x="6645981" y="1295400"/>
-            <a:ext cx="4608693" cy="4800599"/>
-            <a:chOff x="6965209" y="882898"/>
-            <a:chExt cx="5088574" cy="5225401"/>
+            <a:ext cx="2773401" cy="3265233"/>
           </a:xfrm>
-        </p:grpSpPr>
-        <p:pic>
-          <p:nvPicPr>
-            <p:cNvPr id="15" name="Picture 2" descr="Screenshot of Python Installer application">
-              <a:extLst>
-                <a:ext uri="{FF2B5EF4-FFF2-40B4-BE49-F238E27FC236}">
-                  <a16:creationId xmlns:a16="http://schemas.microsoft.com/office/drawing/2014/main" id="{CDCD5ADC-3C33-6B1E-EB18-6FC2BC43483F}"/>
-                </a:ext>
-              </a:extLst>
-            </p:cNvPr>
-            <p:cNvPicPr>
-              <a:picLocks noChangeAspect="1" noChangeArrowheads="1"/>
-            </p:cNvPicPr>
-            <p:nvPr/>
-          </p:nvPicPr>
-          <p:blipFill>
-            <a:blip r:embed="rId2" cstate="print">
-              <a:extLst>
-                <a:ext uri="{28A0092B-C50C-407E-A947-70E740481C1C}">
-                  <a14:useLocalDpi xmlns:a14="http://schemas.microsoft.com/office/drawing/2010/main" val="0"/>
-                </a:ext>
-              </a:extLst>
-            </a:blip>
-            <a:srcRect/>
-            <a:stretch>
-              <a:fillRect/>
-            </a:stretch>
-          </p:blipFill>
-          <p:spPr bwMode="auto">
-            <a:xfrm>
-              <a:off x="6965209" y="882898"/>
-              <a:ext cx="3062182" cy="3554171"/>
-            </a:xfrm>
-            <a:prstGeom prst="rect">
-              <a:avLst/>
-            </a:prstGeom>
-            <a:noFill/>
-            <a:effectLst>
-              <a:outerShdw blurRad="63500" sx="102000" sy="102000" algn="ctr" rotWithShape="0">
-                <a:prstClr val="black">
-                  <a:alpha val="40000"/>
-                </a:prstClr>
-              </a:outerShdw>
-            </a:effectLst>
+          <a:prstGeom prst="rect">
+            <a:avLst/>
+          </a:prstGeom>
+          <a:noFill/>
+          <a:effectLst>
+            <a:outerShdw blurRad="63500" sx="102000" sy="102000" algn="ctr" rotWithShape="0">
+              <a:prstClr val="black">
+                <a:alpha val="40000"/>
+              </a:prstClr>
+            </a:outerShdw>
+          </a:effectLst>
+          <a:extLst>
+            <a:ext uri="{909E8E84-426E-40DD-AFC4-6F175D3DCCD1}">
+              <a14:hiddenFill xmlns:a14="http://schemas.microsoft.com/office/drawing/2010/main">
+                <a:solidFill>
+                  <a:srgbClr val="FFFFFF"/>
+                </a:solidFill>
+              </a14:hiddenFill>
+            </a:ext>
+          </a:extLst>
+        </p:spPr>
+      </p:pic>
+      <p:pic>
+        <p:nvPicPr>
+          <p:cNvPr id="16" name="Picture 15">
             <a:extLst>
-              <a:ext uri="{909E8E84-426E-40DD-AFC4-6F175D3DCCD1}">
-                <a14:hiddenFill xmlns:a14="http://schemas.microsoft.com/office/drawing/2010/main">
-                  <a:solidFill>
-                    <a:srgbClr val="FFFFFF"/>
-                  </a:solidFill>
-                </a14:hiddenFill>
+              <a:ext uri="{FF2B5EF4-FFF2-40B4-BE49-F238E27FC236}">
+                <a16:creationId xmlns:a16="http://schemas.microsoft.com/office/drawing/2014/main" id="{D427F113-1841-AAB2-34F1-B12D5196D14F}"/>
               </a:ext>
             </a:extLst>
-          </p:spPr>
-        </p:pic>
-        <p:pic>
-          <p:nvPicPr>
-            <p:cNvPr id="16" name="Picture 15">
-              <a:extLst>
-                <a:ext uri="{FF2B5EF4-FFF2-40B4-BE49-F238E27FC236}">
-                  <a16:creationId xmlns:a16="http://schemas.microsoft.com/office/drawing/2014/main" id="{D427F113-1841-AAB2-34F1-B12D5196D14F}"/>
-                </a:ext>
-              </a:extLst>
-            </p:cNvPr>
-            <p:cNvPicPr>
-              <a:picLocks noChangeAspect="1"/>
-            </p:cNvPicPr>
-            <p:nvPr/>
-          </p:nvPicPr>
-          <p:blipFill>
-            <a:blip r:embed="rId3"/>
-            <a:stretch>
-              <a:fillRect/>
-            </a:stretch>
-          </p:blipFill>
-          <p:spPr>
-            <a:xfrm>
-              <a:off x="7955809" y="1721098"/>
-              <a:ext cx="3062182" cy="3549001"/>
-            </a:xfrm>
-            <a:prstGeom prst="rect">
-              <a:avLst/>
-            </a:prstGeom>
-            <a:effectLst>
-              <a:outerShdw blurRad="63500" sx="102000" sy="102000" algn="ctr" rotWithShape="0">
-                <a:prstClr val="black">
-                  <a:alpha val="40000"/>
-                </a:prstClr>
-              </a:outerShdw>
-            </a:effectLst>
-          </p:spPr>
-        </p:pic>
-        <p:pic>
-          <p:nvPicPr>
-            <p:cNvPr id="17" name="Picture 16">
-              <a:extLst>
-                <a:ext uri="{FF2B5EF4-FFF2-40B4-BE49-F238E27FC236}">
-                  <a16:creationId xmlns:a16="http://schemas.microsoft.com/office/drawing/2014/main" id="{E03A7B7C-DC1D-0D7F-B9A9-204F73D90B60}"/>
-                </a:ext>
-              </a:extLst>
-            </p:cNvPr>
-            <p:cNvPicPr>
-              <a:picLocks noChangeAspect="1"/>
-            </p:cNvPicPr>
-            <p:nvPr/>
-          </p:nvPicPr>
-          <p:blipFill>
-            <a:blip r:embed="rId4"/>
-            <a:stretch>
-              <a:fillRect/>
-            </a:stretch>
-          </p:blipFill>
-          <p:spPr>
-            <a:xfrm>
-              <a:off x="8991600" y="2559298"/>
-              <a:ext cx="3062183" cy="3549001"/>
-            </a:xfrm>
-            <a:prstGeom prst="rect">
-              <a:avLst/>
-            </a:prstGeom>
-            <a:effectLst>
-              <a:outerShdw blurRad="63500" sx="102000" sy="102000" algn="ctr" rotWithShape="0">
-                <a:prstClr val="black">
-                  <a:alpha val="40000"/>
-                </a:prstClr>
-              </a:outerShdw>
-            </a:effectLst>
-          </p:spPr>
-        </p:pic>
-        <p:sp>
-          <p:nvSpPr>
-            <p:cNvPr id="19" name="Flowchart: Connector 18">
-              <a:extLst>
-                <a:ext uri="{FF2B5EF4-FFF2-40B4-BE49-F238E27FC236}">
-                  <a16:creationId xmlns:a16="http://schemas.microsoft.com/office/drawing/2014/main" id="{C1309A37-ECE1-1E74-04E3-CA000E63C82E}"/>
-                </a:ext>
-              </a:extLst>
-            </p:cNvPr>
-            <p:cNvSpPr/>
-            <p:nvPr/>
-          </p:nvSpPr>
-          <p:spPr>
-            <a:xfrm>
-              <a:off x="7162800" y="3847013"/>
-              <a:ext cx="304800" cy="304800"/>
-            </a:xfrm>
-            <a:prstGeom prst="flowChartConnector">
-              <a:avLst/>
-            </a:prstGeom>
-            <a:ln w="6350"/>
-          </p:spPr>
-          <p:style>
-            <a:lnRef idx="2">
-              <a:schemeClr val="accent1">
-                <a:shade val="50000"/>
-              </a:schemeClr>
-            </a:lnRef>
-            <a:fillRef idx="1">
-              <a:schemeClr val="accent1"/>
-            </a:fillRef>
-            <a:effectRef idx="0">
-              <a:schemeClr val="accent1"/>
-            </a:effectRef>
-            <a:fontRef idx="minor">
-              <a:schemeClr val="lt1"/>
-            </a:fontRef>
-          </p:style>
-          <p:txBody>
-            <a:bodyPr rtlCol="0" anchor="ctr"/>
-            <a:lstStyle/>
-            <a:p>
-              <a:pPr algn="ctr" defTabSz="868680">
-                <a:spcAft>
-                  <a:spcPts val="600"/>
-                </a:spcAft>
-              </a:pPr>
-              <a:r>
-                <a:rPr lang="en-US" sz="1710" kern="1200">
-                  <a:solidFill>
-                    <a:schemeClr val="tx1"/>
-                  </a:solidFill>
-                  <a:latin typeface="+mn-lt"/>
-                  <a:ea typeface="+mn-ea"/>
-                  <a:cs typeface="+mn-cs"/>
-                </a:rPr>
-                <a:t>1</a:t>
-              </a:r>
-              <a:endParaRPr lang="en-US">
-                <a:solidFill>
-                  <a:schemeClr val="tx1"/>
-                </a:solidFill>
-              </a:endParaRPr>
-            </a:p>
-          </p:txBody>
-        </p:sp>
-        <p:sp>
-          <p:nvSpPr>
-            <p:cNvPr id="20" name="Flowchart: Connector 19">
-              <a:extLst>
-                <a:ext uri="{FF2B5EF4-FFF2-40B4-BE49-F238E27FC236}">
-                  <a16:creationId xmlns:a16="http://schemas.microsoft.com/office/drawing/2014/main" id="{053B4538-4321-85F9-AA9E-3E3105BE2D5B}"/>
-                </a:ext>
-              </a:extLst>
-            </p:cNvPr>
-            <p:cNvSpPr/>
-            <p:nvPr/>
-          </p:nvSpPr>
-          <p:spPr>
-            <a:xfrm>
-              <a:off x="8192605" y="4687818"/>
-              <a:ext cx="304800" cy="304800"/>
-            </a:xfrm>
-            <a:prstGeom prst="flowChartConnector">
-              <a:avLst/>
-            </a:prstGeom>
-            <a:ln w="6350"/>
-          </p:spPr>
-          <p:style>
-            <a:lnRef idx="2">
-              <a:schemeClr val="accent1">
-                <a:shade val="50000"/>
-              </a:schemeClr>
-            </a:lnRef>
-            <a:fillRef idx="1">
-              <a:schemeClr val="accent1"/>
-            </a:fillRef>
-            <a:effectRef idx="0">
-              <a:schemeClr val="accent1"/>
-            </a:effectRef>
-            <a:fontRef idx="minor">
-              <a:schemeClr val="lt1"/>
-            </a:fontRef>
-          </p:style>
-          <p:txBody>
-            <a:bodyPr rtlCol="0" anchor="ctr"/>
-            <a:lstStyle/>
-            <a:p>
-              <a:pPr algn="ctr" defTabSz="868680">
-                <a:spcAft>
-                  <a:spcPts val="600"/>
-                </a:spcAft>
-              </a:pPr>
-              <a:r>
-                <a:rPr lang="en-US" sz="1710" kern="1200">
-                  <a:solidFill>
-                    <a:schemeClr val="tx1"/>
-                  </a:solidFill>
-                  <a:latin typeface="+mn-lt"/>
-                  <a:ea typeface="+mn-ea"/>
-                  <a:cs typeface="+mn-cs"/>
-                </a:rPr>
-                <a:t>2</a:t>
-              </a:r>
-              <a:endParaRPr lang="en-US">
-                <a:solidFill>
-                  <a:schemeClr val="tx1"/>
-                </a:solidFill>
-              </a:endParaRPr>
-            </a:p>
-          </p:txBody>
-        </p:sp>
-        <p:sp>
-          <p:nvSpPr>
-            <p:cNvPr id="21" name="Flowchart: Connector 20">
-              <a:extLst>
-                <a:ext uri="{FF2B5EF4-FFF2-40B4-BE49-F238E27FC236}">
-                  <a16:creationId xmlns:a16="http://schemas.microsoft.com/office/drawing/2014/main" id="{90CA5E97-3CFA-1B5B-18EA-E341BA8A42BF}"/>
-                </a:ext>
-              </a:extLst>
-            </p:cNvPr>
-            <p:cNvSpPr/>
-            <p:nvPr/>
-          </p:nvSpPr>
-          <p:spPr>
-            <a:xfrm>
-              <a:off x="9334500" y="5558298"/>
-              <a:ext cx="304800" cy="304800"/>
-            </a:xfrm>
-            <a:prstGeom prst="flowChartConnector">
-              <a:avLst/>
-            </a:prstGeom>
-            <a:ln w="6350"/>
-          </p:spPr>
-          <p:style>
-            <a:lnRef idx="2">
-              <a:schemeClr val="accent1">
-                <a:shade val="50000"/>
-              </a:schemeClr>
-            </a:lnRef>
-            <a:fillRef idx="1">
-              <a:schemeClr val="accent1"/>
-            </a:fillRef>
-            <a:effectRef idx="0">
-              <a:schemeClr val="accent1"/>
-            </a:effectRef>
-            <a:fontRef idx="minor">
-              <a:schemeClr val="lt1"/>
-            </a:fontRef>
-          </p:style>
-          <p:txBody>
-            <a:bodyPr rtlCol="0" anchor="ctr"/>
-            <a:lstStyle/>
-            <a:p>
-              <a:pPr algn="ctr" defTabSz="868680">
-                <a:spcAft>
-                  <a:spcPts val="600"/>
-                </a:spcAft>
-              </a:pPr>
-              <a:r>
-                <a:rPr lang="en-US" sz="1710" kern="1200">
-                  <a:solidFill>
-                    <a:schemeClr val="tx1"/>
-                  </a:solidFill>
-                  <a:latin typeface="+mn-lt"/>
-                  <a:ea typeface="+mn-ea"/>
-                  <a:cs typeface="+mn-cs"/>
-                </a:rPr>
-                <a:t>3</a:t>
-              </a:r>
-              <a:endParaRPr lang="en-US">
-                <a:solidFill>
-                  <a:schemeClr val="tx1"/>
-                </a:solidFill>
-              </a:endParaRPr>
-            </a:p>
-          </p:txBody>
-        </p:sp>
-      </p:grpSp>
+          </p:cNvPr>
+          <p:cNvPicPr>
+            <a:picLocks noChangeAspect="1"/>
+          </p:cNvPicPr>
+          <p:nvPr/>
+        </p:nvPicPr>
+        <p:blipFill>
+          <a:blip r:embed="rId3"/>
+          <a:stretch>
+            <a:fillRect/>
+          </a:stretch>
+        </p:blipFill>
+        <p:spPr>
+          <a:xfrm>
+            <a:off x="7543162" y="2065458"/>
+            <a:ext cx="2773401" cy="3260483"/>
+          </a:xfrm>
+          <a:prstGeom prst="rect">
+            <a:avLst/>
+          </a:prstGeom>
+          <a:effectLst>
+            <a:outerShdw blurRad="63500" sx="102000" sy="102000" algn="ctr" rotWithShape="0">
+              <a:prstClr val="black">
+                <a:alpha val="40000"/>
+              </a:prstClr>
+            </a:outerShdw>
+          </a:effectLst>
+        </p:spPr>
+      </p:pic>
       <p:sp>
         <p:nvSpPr>
-          <p:cNvPr id="22" name="Flowchart: Connector 21">
+          <p:cNvPr id="19" name="Flowchart: Connector 18">
             <a:extLst>
               <a:ext uri="{FF2B5EF4-FFF2-40B4-BE49-F238E27FC236}">
-                <a16:creationId xmlns:a16="http://schemas.microsoft.com/office/drawing/2014/main" id="{B79F84DC-E44C-B6F1-BA0B-0D643FF0742D}"/>
+                <a16:creationId xmlns:a16="http://schemas.microsoft.com/office/drawing/2014/main" id="{C1309A37-ECE1-1E74-04E3-CA000E63C82E}"/>
               </a:ext>
             </a:extLst>
           </p:cNvPr>
@@ -38374,7 +38321,7 @@
         </p:nvSpPr>
         <p:spPr>
           <a:xfrm>
-            <a:off x="560857" y="2282488"/>
+            <a:off x="6842353" y="4104274"/>
             <a:ext cx="276056" cy="280021"/>
           </a:xfrm>
           <a:prstGeom prst="flowChartConnector">
@@ -38408,7 +38355,7 @@
               </a:spcAft>
             </a:pPr>
             <a:r>
-              <a:rPr lang="en-US" sz="1710" kern="1200">
+              <a:rPr lang="en-US" sz="1710" kern="1200" dirty="0">
                 <a:solidFill>
                   <a:schemeClr val="tx1"/>
                 </a:solidFill>
@@ -38418,7 +38365,7 @@
               </a:rPr>
               <a:t>1</a:t>
             </a:r>
-            <a:endParaRPr lang="en-US">
+            <a:endParaRPr lang="en-US" dirty="0">
               <a:solidFill>
                 <a:schemeClr val="tx1"/>
               </a:solidFill>
@@ -38428,10 +38375,10 @@
       </p:sp>
       <p:sp>
         <p:nvSpPr>
-          <p:cNvPr id="23" name="Flowchart: Connector 22">
+          <p:cNvPr id="20" name="Flowchart: Connector 19">
             <a:extLst>
               <a:ext uri="{FF2B5EF4-FFF2-40B4-BE49-F238E27FC236}">
-                <a16:creationId xmlns:a16="http://schemas.microsoft.com/office/drawing/2014/main" id="{6DD9E3A1-56EC-B1B4-C0C3-DFFD2D1E27EA}"/>
+                <a16:creationId xmlns:a16="http://schemas.microsoft.com/office/drawing/2014/main" id="{053B4538-4321-85F9-AA9E-3E3105BE2D5B}"/>
               </a:ext>
             </a:extLst>
           </p:cNvPr>
@@ -38440,7 +38387,7 @@
         </p:nvSpPr>
         <p:spPr>
           <a:xfrm>
-            <a:off x="560857" y="2788005"/>
+            <a:off x="7754290" y="4877830"/>
             <a:ext cx="276056" cy="280021"/>
           </a:xfrm>
           <a:prstGeom prst="flowChartConnector">
@@ -38474,7 +38421,7 @@
               </a:spcAft>
             </a:pPr>
             <a:r>
-              <a:rPr lang="en-US" sz="1710" kern="1200">
+              <a:rPr lang="en-US" sz="1710" kern="1200" dirty="0">
                 <a:solidFill>
                   <a:schemeClr val="tx1"/>
                 </a:solidFill>
@@ -38484,7 +38431,7 @@
               </a:rPr>
               <a:t>2</a:t>
             </a:r>
-            <a:endParaRPr lang="en-US">
+            <a:endParaRPr lang="en-US" dirty="0">
               <a:solidFill>
                 <a:schemeClr val="tx1"/>
               </a:solidFill>
@@ -38494,10 +38441,10 @@
       </p:sp>
       <p:sp>
         <p:nvSpPr>
-          <p:cNvPr id="24" name="Flowchart: Connector 23">
+          <p:cNvPr id="22" name="Flowchart: Connector 21">
             <a:extLst>
               <a:ext uri="{FF2B5EF4-FFF2-40B4-BE49-F238E27FC236}">
-                <a16:creationId xmlns:a16="http://schemas.microsoft.com/office/drawing/2014/main" id="{ED0ECA09-AB0B-40AE-8333-BB759AF3AB7A}"/>
+                <a16:creationId xmlns:a16="http://schemas.microsoft.com/office/drawing/2014/main" id="{B79F84DC-E44C-B6F1-BA0B-0D643FF0742D}"/>
               </a:ext>
             </a:extLst>
           </p:cNvPr>
@@ -38506,7 +38453,7 @@
         </p:nvSpPr>
         <p:spPr>
           <a:xfrm>
-            <a:off x="560857" y="3293522"/>
+            <a:off x="560857" y="2026909"/>
             <a:ext cx="276056" cy="280021"/>
           </a:xfrm>
           <a:prstGeom prst="flowChartConnector">
@@ -38540,7 +38487,7 @@
               </a:spcAft>
             </a:pPr>
             <a:r>
-              <a:rPr lang="en-US" sz="1710" kern="1200">
+              <a:rPr lang="en-US" sz="1710" kern="1200" dirty="0">
                 <a:solidFill>
                   <a:schemeClr val="tx1"/>
                 </a:solidFill>
@@ -38548,9 +38495,9 @@
                 <a:ea typeface="+mn-ea"/>
                 <a:cs typeface="+mn-cs"/>
               </a:rPr>
-              <a:t>3</a:t>
+              <a:t>1</a:t>
             </a:r>
-            <a:endParaRPr lang="en-US">
+            <a:endParaRPr lang="en-US" dirty="0">
               <a:solidFill>
                 <a:schemeClr val="tx1"/>
               </a:solidFill>
@@ -38560,10 +38507,10 @@
       </p:sp>
       <p:sp>
         <p:nvSpPr>
-          <p:cNvPr id="25" name="Smiley Face 24">
+          <p:cNvPr id="23" name="Flowchart: Connector 22">
             <a:extLst>
               <a:ext uri="{FF2B5EF4-FFF2-40B4-BE49-F238E27FC236}">
-                <a16:creationId xmlns:a16="http://schemas.microsoft.com/office/drawing/2014/main" id="{3BF79E7C-6D83-6E26-9272-C23AE45EC2C8}"/>
+                <a16:creationId xmlns:a16="http://schemas.microsoft.com/office/drawing/2014/main" id="{6DD9E3A1-56EC-B1B4-C0C3-DFFD2D1E27EA}"/>
               </a:ext>
             </a:extLst>
           </p:cNvPr>
@@ -38572,17 +38519,13 @@
         </p:nvSpPr>
         <p:spPr>
           <a:xfrm>
-            <a:off x="546485" y="1825280"/>
-            <a:ext cx="304800" cy="304800"/>
+            <a:off x="560857" y="2532426"/>
+            <a:ext cx="276056" cy="280021"/>
           </a:xfrm>
-          <a:prstGeom prst="smileyFace">
+          <a:prstGeom prst="flowChartConnector">
             <a:avLst/>
           </a:prstGeom>
-          <a:ln w="6350">
-            <a:solidFill>
-              <a:schemeClr val="tx1"/>
-            </a:solidFill>
-          </a:ln>
+          <a:ln w="6350"/>
         </p:spPr>
         <p:style>
           <a:lnRef idx="2">
@@ -38609,7 +38552,227 @@
                 <a:spcPts val="600"/>
               </a:spcAft>
             </a:pPr>
-            <a:endParaRPr lang="en-US" sz="1710">
+            <a:r>
+              <a:rPr lang="en-US" sz="1710" kern="1200" dirty="0">
+                <a:solidFill>
+                  <a:schemeClr val="tx1"/>
+                </a:solidFill>
+                <a:latin typeface="+mn-lt"/>
+                <a:ea typeface="+mn-ea"/>
+                <a:cs typeface="+mn-cs"/>
+              </a:rPr>
+              <a:t>2</a:t>
+            </a:r>
+            <a:endParaRPr lang="en-US" dirty="0">
+              <a:solidFill>
+                <a:schemeClr val="tx1"/>
+              </a:solidFill>
+            </a:endParaRPr>
+          </a:p>
+        </p:txBody>
+      </p:sp>
+      <p:sp>
+        <p:nvSpPr>
+          <p:cNvPr id="24" name="Flowchart: Connector 23">
+            <a:extLst>
+              <a:ext uri="{FF2B5EF4-FFF2-40B4-BE49-F238E27FC236}">
+                <a16:creationId xmlns:a16="http://schemas.microsoft.com/office/drawing/2014/main" id="{ED0ECA09-AB0B-40AE-8333-BB759AF3AB7A}"/>
+              </a:ext>
+            </a:extLst>
+          </p:cNvPr>
+          <p:cNvSpPr/>
+          <p:nvPr/>
+        </p:nvSpPr>
+        <p:spPr>
+          <a:xfrm>
+            <a:off x="560857" y="3037943"/>
+            <a:ext cx="276056" cy="280021"/>
+          </a:xfrm>
+          <a:prstGeom prst="flowChartConnector">
+            <a:avLst/>
+          </a:prstGeom>
+          <a:ln w="6350"/>
+        </p:spPr>
+        <p:style>
+          <a:lnRef idx="2">
+            <a:schemeClr val="accent1">
+              <a:shade val="50000"/>
+            </a:schemeClr>
+          </a:lnRef>
+          <a:fillRef idx="1">
+            <a:schemeClr val="accent1"/>
+          </a:fillRef>
+          <a:effectRef idx="0">
+            <a:schemeClr val="accent1"/>
+          </a:effectRef>
+          <a:fontRef idx="minor">
+            <a:schemeClr val="lt1"/>
+          </a:fontRef>
+        </p:style>
+        <p:txBody>
+          <a:bodyPr rtlCol="0" anchor="ctr"/>
+          <a:lstStyle/>
+          <a:p>
+            <a:pPr algn="ctr" defTabSz="868680">
+              <a:spcAft>
+                <a:spcPts val="600"/>
+              </a:spcAft>
+            </a:pPr>
+            <a:r>
+              <a:rPr lang="en-US" sz="1710" kern="1200" dirty="0">
+                <a:solidFill>
+                  <a:schemeClr val="tx1"/>
+                </a:solidFill>
+                <a:latin typeface="+mn-lt"/>
+                <a:ea typeface="+mn-ea"/>
+                <a:cs typeface="+mn-cs"/>
+              </a:rPr>
+              <a:t>3</a:t>
+            </a:r>
+            <a:endParaRPr lang="en-US" dirty="0">
+              <a:solidFill>
+                <a:schemeClr val="tx1"/>
+              </a:solidFill>
+            </a:endParaRPr>
+          </a:p>
+        </p:txBody>
+      </p:sp>
+      <p:sp>
+        <p:nvSpPr>
+          <p:cNvPr id="25" name="Smiley Face 24">
+            <a:extLst>
+              <a:ext uri="{FF2B5EF4-FFF2-40B4-BE49-F238E27FC236}">
+                <a16:creationId xmlns:a16="http://schemas.microsoft.com/office/drawing/2014/main" id="{3BF79E7C-6D83-6E26-9272-C23AE45EC2C8}"/>
+              </a:ext>
+            </a:extLst>
+          </p:cNvPr>
+          <p:cNvSpPr/>
+          <p:nvPr/>
+        </p:nvSpPr>
+        <p:spPr>
+          <a:xfrm>
+            <a:off x="546485" y="1569701"/>
+            <a:ext cx="304800" cy="304800"/>
+          </a:xfrm>
+          <a:prstGeom prst="smileyFace">
+            <a:avLst/>
+          </a:prstGeom>
+          <a:ln w="6350"/>
+        </p:spPr>
+        <p:style>
+          <a:lnRef idx="2">
+            <a:schemeClr val="accent1">
+              <a:shade val="50000"/>
+            </a:schemeClr>
+          </a:lnRef>
+          <a:fillRef idx="1">
+            <a:schemeClr val="accent1"/>
+          </a:fillRef>
+          <a:effectRef idx="0">
+            <a:schemeClr val="accent1"/>
+          </a:effectRef>
+          <a:fontRef idx="minor">
+            <a:schemeClr val="lt1"/>
+          </a:fontRef>
+        </p:style>
+        <p:txBody>
+          <a:bodyPr rtlCol="0" anchor="ctr"/>
+          <a:lstStyle/>
+          <a:p>
+            <a:pPr algn="ctr"/>
+            <a:endParaRPr lang="en-US" dirty="0"/>
+          </a:p>
+        </p:txBody>
+      </p:sp>
+      <p:pic>
+        <p:nvPicPr>
+          <p:cNvPr id="4" name="Picture 3">
+            <a:extLst>
+              <a:ext uri="{FF2B5EF4-FFF2-40B4-BE49-F238E27FC236}">
+                <a16:creationId xmlns:a16="http://schemas.microsoft.com/office/drawing/2014/main" id="{066EE2CC-D446-9BBF-F8E9-350CCCD3E21D}"/>
+              </a:ext>
+            </a:extLst>
+          </p:cNvPr>
+          <p:cNvPicPr>
+            <a:picLocks noChangeAspect="1"/>
+          </p:cNvPicPr>
+          <p:nvPr/>
+        </p:nvPicPr>
+        <p:blipFill>
+          <a:blip r:embed="rId4"/>
+          <a:stretch>
+            <a:fillRect/>
+          </a:stretch>
+        </p:blipFill>
+        <p:spPr>
+          <a:xfrm>
+            <a:off x="8392669" y="2980691"/>
+            <a:ext cx="2782948" cy="2807208"/>
+          </a:xfrm>
+          <a:prstGeom prst="rect">
+            <a:avLst/>
+          </a:prstGeom>
+        </p:spPr>
+      </p:pic>
+      <p:sp>
+        <p:nvSpPr>
+          <p:cNvPr id="21" name="Flowchart: Connector 20">
+            <a:extLst>
+              <a:ext uri="{FF2B5EF4-FFF2-40B4-BE49-F238E27FC236}">
+                <a16:creationId xmlns:a16="http://schemas.microsoft.com/office/drawing/2014/main" id="{90CA5E97-3CFA-1B5B-18EA-E341BA8A42BF}"/>
+              </a:ext>
+            </a:extLst>
+          </p:cNvPr>
+          <p:cNvSpPr/>
+          <p:nvPr/>
+        </p:nvSpPr>
+        <p:spPr>
+          <a:xfrm>
+            <a:off x="8653806" y="5422589"/>
+            <a:ext cx="276056" cy="280021"/>
+          </a:xfrm>
+          <a:prstGeom prst="flowChartConnector">
+            <a:avLst/>
+          </a:prstGeom>
+          <a:ln w="6350"/>
+        </p:spPr>
+        <p:style>
+          <a:lnRef idx="2">
+            <a:schemeClr val="accent1">
+              <a:shade val="50000"/>
+            </a:schemeClr>
+          </a:lnRef>
+          <a:fillRef idx="1">
+            <a:schemeClr val="accent1"/>
+          </a:fillRef>
+          <a:effectRef idx="0">
+            <a:schemeClr val="accent1"/>
+          </a:effectRef>
+          <a:fontRef idx="minor">
+            <a:schemeClr val="lt1"/>
+          </a:fontRef>
+        </p:style>
+        <p:txBody>
+          <a:bodyPr rtlCol="0" anchor="ctr"/>
+          <a:lstStyle/>
+          <a:p>
+            <a:pPr algn="ctr" defTabSz="868680">
+              <a:spcAft>
+                <a:spcPts val="600"/>
+              </a:spcAft>
+            </a:pPr>
+            <a:r>
+              <a:rPr lang="en-US" sz="1710" kern="1200" dirty="0">
+                <a:solidFill>
+                  <a:schemeClr val="tx1"/>
+                </a:solidFill>
+                <a:latin typeface="+mn-lt"/>
+                <a:ea typeface="+mn-ea"/>
+                <a:cs typeface="+mn-cs"/>
+              </a:rPr>
+              <a:t>3</a:t>
+            </a:r>
+            <a:endParaRPr lang="en-US" dirty="0">
               <a:solidFill>
                 <a:schemeClr val="tx1"/>
               </a:solidFill>
@@ -38675,18 +38838,18 @@
           <a:p>
             <a:pPr algn="ctr"/>
             <a:r>
-              <a:rPr lang="en-US"/>
+              <a:rPr lang="en-US" dirty="0"/>
               <a:t>Live Demo &amp; </a:t>
             </a:r>
             <a:r>
-              <a:rPr lang="en-US">
+              <a:rPr lang="en-US" dirty="0">
                 <a:solidFill>
                   <a:srgbClr val="000000"/>
                 </a:solidFill>
               </a:rPr>
               <a:t>Tips &amp; Tricks</a:t>
             </a:r>
-            <a:endParaRPr lang="en-US"/>
+            <a:endParaRPr lang="en-US" dirty="0"/>
           </a:p>
         </p:txBody>
       </p:sp>
@@ -38705,7 +38868,7 @@
         <p:spPr>
           <a:xfrm>
             <a:off x="152623" y="5638800"/>
-            <a:ext cx="11886753" cy="938719"/>
+            <a:ext cx="11886753" cy="600164"/>
           </a:xfrm>
           <a:prstGeom prst="rect">
             <a:avLst/>
@@ -38713,7 +38876,7 @@
           <a:noFill/>
         </p:spPr>
         <p:txBody>
-          <a:bodyPr wrap="square" lIns="91440" tIns="45720" rIns="91440" bIns="45720" anchor="t">
+          <a:bodyPr wrap="square">
             <a:spAutoFit/>
           </a:bodyPr>
           <a:lstStyle/>
@@ -38761,22 +38924,8 @@
                 </a:solidFill>
                 <a:effectLst/>
               </a:rPr>
-              <a:t>.</a:t>
+              <a:t>. </a:t>
             </a:r>
-            <a:r>
-              <a:rPr lang="en-US" sz="1100" dirty="0">
-                <a:solidFill>
-                  <a:srgbClr val="1F2328"/>
-                </a:solidFill>
-              </a:rPr>
-              <a:t> </a:t>
-            </a:r>
-            <a:endParaRPr lang="en-US" sz="1100" b="0" i="0">
-              <a:solidFill>
-                <a:srgbClr val="1F2328"/>
-              </a:solidFill>
-              <a:effectLst/>
-            </a:endParaRPr>
           </a:p>
           <a:p>
             <a:pPr algn="l"/>
@@ -38817,13 +38966,6 @@
               </a:rPr>
               <a:t> page</a:t>
             </a:r>
-            <a:endParaRPr lang="en-US" sz="1100" b="0" i="0" dirty="0">
-              <a:solidFill>
-                <a:srgbClr val="000000"/>
-              </a:solidFill>
-              <a:effectLst/>
-              <a:cs typeface="Calibri"/>
-            </a:endParaRPr>
           </a:p>
           <a:p>
             <a:pPr algn="l"/>
@@ -38864,31 +39006,6 @@
               </a:rPr>
               <a:t> site. Information on how to report vulnerabilities is also found.</a:t>
             </a:r>
-            <a:endParaRPr lang="en-US" sz="1100" b="0" i="0" dirty="0">
-              <a:solidFill>
-                <a:srgbClr val="000000"/>
-              </a:solidFill>
-              <a:effectLst/>
-              <a:cs typeface="Calibri"/>
-            </a:endParaRPr>
-          </a:p>
-          <a:p>
-            <a:r>
-              <a:rPr lang="en-US" sz="1100" dirty="0">
-                <a:solidFill>
-                  <a:srgbClr val="000000"/>
-                </a:solidFill>
-              </a:rPr>
-              <a:t>This applies to all slides in this presentation. </a:t>
-            </a:r>
-          </a:p>
-          <a:p>
-            <a:endParaRPr lang="en-US" sz="1100" dirty="0">
-              <a:solidFill>
-                <a:srgbClr val="000000"/>
-              </a:solidFill>
-              <a:cs typeface="Calibri"/>
-            </a:endParaRPr>
           </a:p>
         </p:txBody>
       </p:sp>
@@ -38896,119 +39013,6 @@
     <p:extLst>
       <p:ext uri="{BB962C8B-B14F-4D97-AF65-F5344CB8AC3E}">
         <p14:creationId xmlns:p14="http://schemas.microsoft.com/office/powerpoint/2010/main" val="3831838140"/>
-      </p:ext>
-    </p:extLst>
-  </p:cSld>
-  <p:clrMapOvr>
-    <a:masterClrMapping/>
-  </p:clrMapOvr>
-</p:sld>
-</file>
-
-<file path=ppt/slides/slide7.xml><?xml version="1.0" encoding="utf-8"?>
-<p:sld xmlns:a="http://schemas.openxmlformats.org/drawingml/2006/main" xmlns:r="http://schemas.openxmlformats.org/officeDocument/2006/relationships" xmlns:p="http://schemas.openxmlformats.org/presentationml/2006/main">
-  <p:cSld>
-    <p:spTree>
-      <p:nvGrpSpPr>
-        <p:cNvPr id="1" name=""/>
-        <p:cNvGrpSpPr/>
-        <p:nvPr/>
-      </p:nvGrpSpPr>
-      <p:grpSpPr>
-        <a:xfrm>
-          <a:off x="0" y="0"/>
-          <a:ext cx="0" cy="0"/>
-          <a:chOff x="0" y="0"/>
-          <a:chExt cx="0" cy="0"/>
-        </a:xfrm>
-      </p:grpSpPr>
-      <p:sp>
-        <p:nvSpPr>
-          <p:cNvPr id="6" name="Title 1">
-            <a:extLst>
-              <a:ext uri="{FF2B5EF4-FFF2-40B4-BE49-F238E27FC236}">
-                <a16:creationId xmlns:a16="http://schemas.microsoft.com/office/drawing/2014/main" id="{65F8CEE7-9CAA-00AB-79E7-2E58A854A5AA}"/>
-              </a:ext>
-            </a:extLst>
-          </p:cNvPr>
-          <p:cNvSpPr txBox="1">
-            <a:spLocks/>
-          </p:cNvSpPr>
-          <p:nvPr/>
-        </p:nvSpPr>
-        <p:spPr>
-          <a:xfrm>
-            <a:off x="305246" y="3162303"/>
-            <a:ext cx="11581505" cy="533393"/>
-          </a:xfrm>
-          <a:prstGeom prst="rect">
-            <a:avLst/>
-          </a:prstGeom>
-        </p:spPr>
-        <p:txBody>
-          <a:bodyPr lIns="91440" tIns="45720" rIns="91440" bIns="45720" anchor="t"/>
-          <a:lstStyle>
-            <a:lvl1pPr algn="l" defTabSz="914400" rtl="0" eaLnBrk="1" latinLnBrk="0" hangingPunct="1">
-              <a:lnSpc>
-                <a:spcPct val="90000"/>
-              </a:lnSpc>
-              <a:spcBef>
-                <a:spcPct val="0"/>
-              </a:spcBef>
-              <a:buNone/>
-              <a:defRPr sz="3200" b="0" kern="1200">
-                <a:solidFill>
-                  <a:schemeClr val="tx1"/>
-                </a:solidFill>
-                <a:latin typeface="+mj-lt"/>
-                <a:ea typeface="+mj-ea"/>
-                <a:cs typeface="+mj-cs"/>
-              </a:defRPr>
-            </a:lvl1pPr>
-          </a:lstStyle>
-          <a:p>
-            <a:pPr algn="ctr"/>
-            <a:r>
-              <a:rPr lang="en-US" dirty="0"/>
-              <a:t>Q&amp;A</a:t>
-            </a:r>
-          </a:p>
-        </p:txBody>
-      </p:sp>
-    </p:spTree>
-    <p:extLst>
-      <p:ext uri="{BB962C8B-B14F-4D97-AF65-F5344CB8AC3E}">
-        <p14:creationId xmlns:p14="http://schemas.microsoft.com/office/powerpoint/2010/main" val="3773401128"/>
-      </p:ext>
-    </p:extLst>
-  </p:cSld>
-  <p:clrMapOvr>
-    <a:masterClrMapping/>
-  </p:clrMapOvr>
-</p:sld>
-</file>
-
-<file path=ppt/slides/slide8.xml><?xml version="1.0" encoding="utf-8"?>
-<p:sld xmlns:a="http://schemas.openxmlformats.org/drawingml/2006/main" xmlns:r="http://schemas.openxmlformats.org/officeDocument/2006/relationships" xmlns:p="http://schemas.openxmlformats.org/presentationml/2006/main">
-  <p:cSld>
-    <p:spTree>
-      <p:nvGrpSpPr>
-        <p:cNvPr id="1" name=""/>
-        <p:cNvGrpSpPr/>
-        <p:nvPr/>
-      </p:nvGrpSpPr>
-      <p:grpSpPr>
-        <a:xfrm>
-          <a:off x="0" y="0"/>
-          <a:ext cx="0" cy="0"/>
-          <a:chOff x="0" y="0"/>
-          <a:chExt cx="0" cy="0"/>
-        </a:xfrm>
-      </p:grpSpPr>
-    </p:spTree>
-    <p:extLst>
-      <p:ext uri="{BB962C8B-B14F-4D97-AF65-F5344CB8AC3E}">
-        <p14:creationId xmlns:p14="http://schemas.microsoft.com/office/powerpoint/2010/main" val="1231603674"/>
       </p:ext>
     </p:extLst>
   </p:cSld>
@@ -39830,6 +39834,15 @@
 </file>
 
 <file path=customXml/item1.xml><?xml version="1.0" encoding="utf-8"?>
+<?mso-contentType ?>
+<FormTemplates xmlns="http://schemas.microsoft.com/sharepoint/v3/contenttype/forms">
+  <Display>DocumentLibraryForm</Display>
+  <Edit>DocumentLibraryForm</Edit>
+  <New>DocumentLibraryForm</New>
+</FormTemplates>
+</file>
+
+<file path=customXml/item2.xml><?xml version="1.0" encoding="utf-8"?>
 <p:properties xmlns:p="http://schemas.microsoft.com/office/2006/metadata/properties" xmlns:xsi="http://www.w3.org/2001/XMLSchema-instance" xmlns:pc="http://schemas.microsoft.com/office/infopath/2007/PartnerControls">
   <documentManagement>
     <_ip_UnifiedCompliancePolicyUIAction xmlns="http://schemas.microsoft.com/sharepoint/v3" xsi:nil="true"/>
@@ -39853,15 +39866,6 @@
     </SharedWithUsers>
   </documentManagement>
 </p:properties>
-</file>
-
-<file path=customXml/item2.xml><?xml version="1.0" encoding="utf-8"?>
-<?mso-contentType ?>
-<FormTemplates xmlns="http://schemas.microsoft.com/sharepoint/v3/contenttype/forms">
-  <Display>DocumentLibraryForm</Display>
-  <Edit>DocumentLibraryForm</Edit>
-  <New>DocumentLibraryForm</New>
-</FormTemplates>
 </file>
 
 <file path=customXml/item3.xml><?xml version="1.0" encoding="utf-8"?>
@@ -40065,24 +40069,6 @@
 </file>
 
 <file path=customXml/itemProps1.xml><?xml version="1.0" encoding="utf-8"?>
-<ds:datastoreItem xmlns:ds="http://schemas.openxmlformats.org/officeDocument/2006/customXml" ds:itemID="{91C2FC69-BA58-4814-9B90-1CD8B9F0DC38}">
-  <ds:schemaRefs>
-    <ds:schemaRef ds:uri="67f2c53b-c9cf-4dee-ba48-f650cd6f71f3"/>
-    <ds:schemaRef ds:uri="743a423d-6da4-4288-a587-e1f6aaf83bb1"/>
-    <ds:schemaRef ds:uri="http://purl.org/dc/dcmitype/"/>
-    <ds:schemaRef ds:uri="http://purl.org/dc/elements/1.1/"/>
-    <ds:schemaRef ds:uri="http://purl.org/dc/terms/"/>
-    <ds:schemaRef ds:uri="http://schemas.microsoft.com/office/2006/documentManagement/types"/>
-    <ds:schemaRef ds:uri="http://schemas.microsoft.com/office/2006/metadata/properties"/>
-    <ds:schemaRef ds:uri="http://schemas.microsoft.com/office/infopath/2007/PartnerControls"/>
-    <ds:schemaRef ds:uri="http://schemas.microsoft.com/sharepoint/v3"/>
-    <ds:schemaRef ds:uri="http://schemas.openxmlformats.org/package/2006/metadata/core-properties"/>
-    <ds:schemaRef ds:uri="http://www.w3.org/XML/1998/namespace"/>
-  </ds:schemaRefs>
-</ds:datastoreItem>
-</file>
-
-<file path=customXml/itemProps2.xml><?xml version="1.0" encoding="utf-8"?>
 <ds:datastoreItem xmlns:ds="http://schemas.openxmlformats.org/officeDocument/2006/customXml" ds:itemID="{BDBA2145-B46A-4119-8696-EBA3564E3F91}">
   <ds:schemaRefs>
     <ds:schemaRef ds:uri="http://schemas.microsoft.com/sharepoint/v3/contenttype/forms"/>
@@ -40090,22 +40076,40 @@
 </ds:datastoreItem>
 </file>
 
+<file path=customXml/itemProps2.xml><?xml version="1.0" encoding="utf-8"?>
+<ds:datastoreItem xmlns:ds="http://schemas.openxmlformats.org/officeDocument/2006/customXml" ds:itemID="{91C2FC69-BA58-4814-9B90-1CD8B9F0DC38}">
+  <ds:schemaRefs>
+    <ds:schemaRef ds:uri="http://schemas.microsoft.com/office/2006/documentManagement/types"/>
+    <ds:schemaRef ds:uri="http://purl.org/dc/terms/"/>
+    <ds:schemaRef ds:uri="http://www.w3.org/XML/1998/namespace"/>
+    <ds:schemaRef ds:uri="http://purl.org/dc/dcmitype/"/>
+    <ds:schemaRef ds:uri="http://schemas.microsoft.com/office/infopath/2007/PartnerControls"/>
+    <ds:schemaRef ds:uri="http://purl.org/dc/elements/1.1/"/>
+    <ds:schemaRef ds:uri="http://schemas.microsoft.com/sharepoint/v3"/>
+    <ds:schemaRef ds:uri="http://schemas.openxmlformats.org/package/2006/metadata/core-properties"/>
+    <ds:schemaRef ds:uri="67f2c53b-c9cf-4dee-ba48-f650cd6f71f3"/>
+    <ds:schemaRef ds:uri="743a423d-6da4-4288-a587-e1f6aaf83bb1"/>
+    <ds:schemaRef ds:uri="http://schemas.microsoft.com/office/2006/metadata/properties"/>
+  </ds:schemaRefs>
+</ds:datastoreItem>
+</file>
+
 <file path=customXml/itemProps3.xml><?xml version="1.0" encoding="utf-8"?>
 <ds:datastoreItem xmlns:ds="http://schemas.openxmlformats.org/officeDocument/2006/customXml" ds:itemID="{E4954596-45B7-427C-B7EB-5EB53003531B}">
   <ds:schemaRefs>
+    <ds:schemaRef ds:uri="http://schemas.microsoft.com/office/2006/metadata/contentType"/>
+    <ds:schemaRef ds:uri="http://schemas.microsoft.com/office/2006/metadata/properties/metaAttributes"/>
+    <ds:schemaRef ds:uri="http://www.w3.org/2001/XMLSchema"/>
+    <ds:schemaRef ds:uri="http://schemas.microsoft.com/office/2006/metadata/properties"/>
+    <ds:schemaRef ds:uri="http://schemas.microsoft.com/sharepoint/v3"/>
+    <ds:schemaRef ds:uri="743a423d-6da4-4288-a587-e1f6aaf83bb1"/>
     <ds:schemaRef ds:uri="67f2c53b-c9cf-4dee-ba48-f650cd6f71f3"/>
-    <ds:schemaRef ds:uri="743a423d-6da4-4288-a587-e1f6aaf83bb1"/>
+    <ds:schemaRef ds:uri="http://schemas.microsoft.com/office/2006/documentManagement/types"/>
+    <ds:schemaRef ds:uri="http://schemas.microsoft.com/office/infopath/2007/PartnerControls"/>
+    <ds:schemaRef ds:uri="http://schemas.openxmlformats.org/package/2006/metadata/core-properties"/>
     <ds:schemaRef ds:uri="http://purl.org/dc/elements/1.1/"/>
     <ds:schemaRef ds:uri="http://purl.org/dc/terms/"/>
     <ds:schemaRef ds:uri="http://schemas.microsoft.com/internal/obd"/>
-    <ds:schemaRef ds:uri="http://schemas.microsoft.com/office/2006/documentManagement/types"/>
-    <ds:schemaRef ds:uri="http://schemas.microsoft.com/office/2006/metadata/contentType"/>
-    <ds:schemaRef ds:uri="http://schemas.microsoft.com/office/2006/metadata/properties"/>
-    <ds:schemaRef ds:uri="http://schemas.microsoft.com/office/2006/metadata/properties/metaAttributes"/>
-    <ds:schemaRef ds:uri="http://schemas.microsoft.com/office/infopath/2007/PartnerControls"/>
-    <ds:schemaRef ds:uri="http://schemas.microsoft.com/sharepoint/v3"/>
-    <ds:schemaRef ds:uri="http://schemas.openxmlformats.org/package/2006/metadata/core-properties"/>
-    <ds:schemaRef ds:uri="http://www.w3.org/2001/XMLSchema"/>
   </ds:schemaRefs>
 </ds:datastoreItem>
 </file>

</xml_diff>